<commit_message>
added make + run slide and fixed some typos
</commit_message>
<xml_diff>
--- a/w10/CSCI3753_REC_10.pptx
+++ b/w10/CSCI3753_REC_10.pptx
@@ -283,7 +283,7 @@
       </p15:sldGuideLst>
     </p:ext>
     <p:ext uri="GoogleSlidesCustomDataVersion2">
-      <go:slidesCustomData xmlns:go="http://customooxmlschemas.google.com/" r:id="rId28" roundtripDataSignature="AMtx7miIjwD1foXUQ2nPNR2jseIX8ws0GA=="/>
+      <go:slidesCustomData xmlns:go="http://customooxmlschemas.google.com/" r:id="rId28" roundtripDataSignature="AMtx7mhrgRBCOGWFuqE+/+F1lRntgGHc7A=="/>
     </p:ext>
   </p:extLst>
 </p:presentation>
@@ -1571,7 +1571,7 @@
       </p:grpSpPr>
       <p:sp>
         <p:nvSpPr>
-          <p:cNvPr id="187" name="Google Shape;187;g39ec7bcbe7a_0_74:notes"/>
+          <p:cNvPr id="187" name="Google Shape;187;g39ec7bcbe7a_0_86:notes"/>
           <p:cNvSpPr txBox="1"/>
           <p:nvPr>
             <p:ph idx="1" type="body"/>
@@ -1618,7 +1618,7 @@
       </p:sp>
       <p:sp>
         <p:nvSpPr>
-          <p:cNvPr id="188" name="Google Shape;188;g39ec7bcbe7a_0_74:notes"/>
+          <p:cNvPr id="188" name="Google Shape;188;g39ec7bcbe7a_0_86:notes"/>
           <p:cNvSpPr/>
           <p:nvPr>
             <p:ph idx="2" type="sldImg"/>
@@ -1688,7 +1688,7 @@
       </p:grpSpPr>
       <p:sp>
         <p:nvSpPr>
-          <p:cNvPr id="194" name="Google Shape;194;g39ec7bcbe7a_0_86:notes"/>
+          <p:cNvPr id="194" name="Google Shape;194;g39ec7bcbe7a_0_80:notes"/>
           <p:cNvSpPr txBox="1"/>
           <p:nvPr>
             <p:ph idx="1" type="body"/>
@@ -1735,7 +1735,7 @@
       </p:sp>
       <p:sp>
         <p:nvSpPr>
-          <p:cNvPr id="195" name="Google Shape;195;g39ec7bcbe7a_0_86:notes"/>
+          <p:cNvPr id="195" name="Google Shape;195;g39ec7bcbe7a_0_80:notes"/>
           <p:cNvSpPr/>
           <p:nvPr>
             <p:ph idx="2" type="sldImg"/>
@@ -1805,7 +1805,7 @@
       </p:grpSpPr>
       <p:sp>
         <p:nvSpPr>
-          <p:cNvPr id="201" name="Google Shape;201;g39ec7bcbe7a_0_80:notes"/>
+          <p:cNvPr id="201" name="Google Shape;201;g39ec7bcbe7a_0_92:notes"/>
           <p:cNvSpPr txBox="1"/>
           <p:nvPr>
             <p:ph idx="1" type="body"/>
@@ -1852,7 +1852,7 @@
       </p:sp>
       <p:sp>
         <p:nvSpPr>
-          <p:cNvPr id="202" name="Google Shape;202;g39ec7bcbe7a_0_80:notes"/>
+          <p:cNvPr id="202" name="Google Shape;202;g39ec7bcbe7a_0_92:notes"/>
           <p:cNvSpPr/>
           <p:nvPr>
             <p:ph idx="2" type="sldImg"/>
@@ -1908,7 +1908,7 @@
   <p:cSld>
     <p:spTree>
       <p:nvGrpSpPr>
-        <p:cNvPr id="207" name="Shape 207"/>
+        <p:cNvPr id="272" name="Shape 272"/>
         <p:cNvGrpSpPr/>
         <p:nvPr/>
       </p:nvGrpSpPr>
@@ -1922,7 +1922,7 @@
       </p:grpSpPr>
       <p:sp>
         <p:nvSpPr>
-          <p:cNvPr id="208" name="Google Shape;208;g39ec7bcbe7a_0_92:notes"/>
+          <p:cNvPr id="273" name="Google Shape;273;g39ec7bcbe7a_0_169:notes"/>
           <p:cNvSpPr txBox="1"/>
           <p:nvPr>
             <p:ph idx="1" type="body"/>
@@ -1969,7 +1969,7 @@
       </p:sp>
       <p:sp>
         <p:nvSpPr>
-          <p:cNvPr id="209" name="Google Shape;209;g39ec7bcbe7a_0_92:notes"/>
+          <p:cNvPr id="274" name="Google Shape;274;g39ec7bcbe7a_0_169:notes"/>
           <p:cNvSpPr/>
           <p:nvPr>
             <p:ph idx="2" type="sldImg"/>
@@ -2039,7 +2039,7 @@
       </p:grpSpPr>
       <p:sp>
         <p:nvSpPr>
-          <p:cNvPr id="280" name="Google Shape;280;g39ec7bcbe7a_0_169:notes"/>
+          <p:cNvPr id="280" name="Google Shape;280;g394de495115_0_0:notes"/>
           <p:cNvSpPr txBox="1"/>
           <p:nvPr>
             <p:ph idx="1" type="body"/>
@@ -2086,7 +2086,7 @@
       </p:sp>
       <p:sp>
         <p:nvSpPr>
-          <p:cNvPr id="281" name="Google Shape;281;g39ec7bcbe7a_0_169:notes"/>
+          <p:cNvPr id="281" name="Google Shape;281;g394de495115_0_0:notes"/>
           <p:cNvSpPr/>
           <p:nvPr>
             <p:ph idx="2" type="sldImg"/>
@@ -2259,7 +2259,7 @@
   <p:cSld>
     <p:spTree>
       <p:nvGrpSpPr>
-        <p:cNvPr id="286" name="Shape 286"/>
+        <p:cNvPr id="290" name="Shape 290"/>
         <p:cNvGrpSpPr/>
         <p:nvPr/>
       </p:nvGrpSpPr>
@@ -2273,7 +2273,7 @@
       </p:grpSpPr>
       <p:sp>
         <p:nvSpPr>
-          <p:cNvPr id="287" name="Google Shape;287;g394de495115_0_0:notes"/>
+          <p:cNvPr id="291" name="Google Shape;291;g39ec7bcbe7a_0_175:notes"/>
           <p:cNvSpPr txBox="1"/>
           <p:nvPr>
             <p:ph idx="1" type="body"/>
@@ -2320,7 +2320,7 @@
       </p:sp>
       <p:sp>
         <p:nvSpPr>
-          <p:cNvPr id="288" name="Google Shape;288;g394de495115_0_0:notes"/>
+          <p:cNvPr id="292" name="Google Shape;292;g39ec7bcbe7a_0_175:notes"/>
           <p:cNvSpPr/>
           <p:nvPr>
             <p:ph idx="2" type="sldImg"/>
@@ -2390,7 +2390,7 @@
       </p:grpSpPr>
       <p:sp>
         <p:nvSpPr>
-          <p:cNvPr id="298" name="Google Shape;298;g39ec7bcbe7a_0_175:notes"/>
+          <p:cNvPr id="298" name="Google Shape;298;g39f09b76c23_0_6:notes"/>
           <p:cNvSpPr txBox="1"/>
           <p:nvPr>
             <p:ph idx="1" type="body"/>
@@ -2437,7 +2437,7 @@
       </p:sp>
       <p:sp>
         <p:nvSpPr>
-          <p:cNvPr id="299" name="Google Shape;299;g39ec7bcbe7a_0_175:notes"/>
+          <p:cNvPr id="299" name="Google Shape;299;g39f09b76c23_0_6:notes"/>
           <p:cNvSpPr/>
           <p:nvPr>
             <p:ph idx="2" type="sldImg"/>
@@ -18840,7 +18840,7 @@
       </p:grpSpPr>
       <p:sp>
         <p:nvSpPr>
-          <p:cNvPr id="190" name="Google Shape;190;g39ec7bcbe7a_0_74"/>
+          <p:cNvPr id="190" name="Google Shape;190;g39ec7bcbe7a_0_86"/>
           <p:cNvSpPr txBox="1"/>
           <p:nvPr/>
         </p:nvSpPr>
@@ -18886,7 +18886,7 @@
                   <a:schemeClr val="dk1"/>
                 </a:solidFill>
               </a:rPr>
-              <a:t>Page Replacement Algorithms </a:t>
+              <a:t>First In First Out (FIFO)</a:t>
             </a:r>
             <a:endParaRPr b="0" i="0" sz="4000" u="none" cap="none" strike="noStrike">
               <a:solidFill>
@@ -18902,7 +18902,7 @@
       </p:sp>
       <p:sp>
         <p:nvSpPr>
-          <p:cNvPr id="191" name="Google Shape;191;g39ec7bcbe7a_0_74"/>
+          <p:cNvPr id="191" name="Google Shape;191;g39ec7bcbe7a_0_86"/>
           <p:cNvSpPr txBox="1"/>
           <p:nvPr/>
         </p:nvSpPr>
@@ -18968,7 +18968,7 @@
       </p:sp>
       <p:sp>
         <p:nvSpPr>
-          <p:cNvPr id="192" name="Google Shape;192;g39ec7bcbe7a_0_74"/>
+          <p:cNvPr id="192" name="Google Shape;192;g39ec7bcbe7a_0_86"/>
           <p:cNvSpPr txBox="1"/>
           <p:nvPr/>
         </p:nvSpPr>
@@ -19013,7 +19013,7 @@
                   <a:schemeClr val="dk1"/>
                 </a:solidFill>
               </a:rPr>
-              <a:t>A page replacement algorithm picks a page to be paged out and frees up a frame</a:t>
+              <a:t>Idea: The oldest page in physical memory is the one selected for replacement</a:t>
             </a:r>
             <a:endParaRPr sz="2300">
               <a:solidFill>
@@ -19022,20 +19022,29 @@
             </a:endParaRPr>
           </a:p>
           <a:p>
-            <a:pPr indent="0" lvl="0" marL="457200" marR="0" rtl="0" algn="l">
-              <a:lnSpc>
-                <a:spcPct val="100000"/>
-              </a:lnSpc>
-              <a:spcBef>
-                <a:spcPts val="0"/>
-              </a:spcBef>
-              <a:spcAft>
-                <a:spcPts val="0"/>
-              </a:spcAft>
-              <a:buNone/>
+            <a:pPr indent="-374650" lvl="0" marL="457200" marR="0" rtl="0" algn="l">
+              <a:lnSpc>
+                <a:spcPct val="100000"/>
+              </a:lnSpc>
+              <a:spcBef>
+                <a:spcPts val="0"/>
+              </a:spcBef>
+              <a:spcAft>
+                <a:spcPts val="0"/>
+              </a:spcAft>
+              <a:buClr>
+                <a:schemeClr val="dk1"/>
+              </a:buClr>
+              <a:buSzPts val="2300"/>
+              <a:buChar char="●"/>
             </a:pPr>
             <a:r>
-              <a:t/>
+              <a:rPr lang="en-US" sz="2300">
+                <a:solidFill>
+                  <a:schemeClr val="dk1"/>
+                </a:solidFill>
+              </a:rPr>
+              <a:t>Extremely simple to implement</a:t>
             </a:r>
             <a:endParaRPr sz="2300">
               <a:solidFill>
@@ -19066,7 +19075,7 @@
                   <a:schemeClr val="dk1"/>
                 </a:solidFill>
               </a:rPr>
-              <a:t>Optimal - the one that leads to the least faults</a:t>
+              <a:t>Keep a list</a:t>
             </a:r>
             <a:endParaRPr sz="2300">
               <a:solidFill>
@@ -19075,20 +19084,91 @@
             </a:endParaRPr>
           </a:p>
           <a:p>
-            <a:pPr indent="0" lvl="0" marL="914400" marR="0" rtl="0" algn="l">
-              <a:lnSpc>
-                <a:spcPct val="100000"/>
-              </a:lnSpc>
-              <a:spcBef>
-                <a:spcPts val="0"/>
-              </a:spcBef>
-              <a:spcAft>
-                <a:spcPts val="0"/>
-              </a:spcAft>
-              <a:buNone/>
+            <a:pPr indent="-374650" lvl="2" marL="1371600" marR="0" rtl="0" algn="l">
+              <a:lnSpc>
+                <a:spcPct val="100000"/>
+              </a:lnSpc>
+              <a:spcBef>
+                <a:spcPts val="0"/>
+              </a:spcBef>
+              <a:spcAft>
+                <a:spcPts val="0"/>
+              </a:spcAft>
+              <a:buClr>
+                <a:schemeClr val="dk1"/>
+              </a:buClr>
+              <a:buSzPts val="2300"/>
+              <a:buChar char="■"/>
             </a:pPr>
             <a:r>
-              <a:t/>
+              <a:rPr lang="en-US" sz="2300">
+                <a:solidFill>
+                  <a:schemeClr val="dk1"/>
+                </a:solidFill>
+              </a:rPr>
+              <a:t>Victims are chosen from the tail</a:t>
+            </a:r>
+            <a:endParaRPr sz="2300">
+              <a:solidFill>
+                <a:schemeClr val="dk1"/>
+              </a:solidFill>
+            </a:endParaRPr>
+          </a:p>
+          <a:p>
+            <a:pPr indent="-374650" lvl="2" marL="1371600" marR="0" rtl="0" algn="l">
+              <a:lnSpc>
+                <a:spcPct val="100000"/>
+              </a:lnSpc>
+              <a:spcBef>
+                <a:spcPts val="0"/>
+              </a:spcBef>
+              <a:spcAft>
+                <a:spcPts val="0"/>
+              </a:spcAft>
+              <a:buClr>
+                <a:schemeClr val="dk1"/>
+              </a:buClr>
+              <a:buSzPts val="2300"/>
+              <a:buChar char="■"/>
+            </a:pPr>
+            <a:r>
+              <a:rPr lang="en-US" sz="2300">
+                <a:solidFill>
+                  <a:schemeClr val="dk1"/>
+                </a:solidFill>
+              </a:rPr>
+              <a:t>New pages are placed on the head</a:t>
+            </a:r>
+            <a:endParaRPr sz="2300">
+              <a:solidFill>
+                <a:schemeClr val="dk1"/>
+              </a:solidFill>
+            </a:endParaRPr>
+          </a:p>
+          <a:p>
+            <a:pPr indent="-374650" lvl="0" marL="457200" marR="0" rtl="0" algn="l">
+              <a:lnSpc>
+                <a:spcPct val="100000"/>
+              </a:lnSpc>
+              <a:spcBef>
+                <a:spcPts val="0"/>
+              </a:spcBef>
+              <a:spcAft>
+                <a:spcPts val="0"/>
+              </a:spcAft>
+              <a:buClr>
+                <a:schemeClr val="dk1"/>
+              </a:buClr>
+              <a:buSzPts val="2300"/>
+              <a:buChar char="●"/>
+            </a:pPr>
+            <a:r>
+              <a:rPr lang="en-US" sz="2300">
+                <a:solidFill>
+                  <a:schemeClr val="dk1"/>
+                </a:solidFill>
+              </a:rPr>
+              <a:t>Performance can be poor</a:t>
             </a:r>
             <a:endParaRPr sz="2300">
               <a:solidFill>
@@ -19119,7 +19199,7 @@
                   <a:schemeClr val="dk1"/>
                 </a:solidFill>
               </a:rPr>
-              <a:t>FIFO - First In, First Out</a:t>
+              <a:t>FIFO does not consider page usage</a:t>
             </a:r>
             <a:endParaRPr sz="2300">
               <a:solidFill>
@@ -19128,29 +19208,7 @@
             </a:endParaRPr>
           </a:p>
           <a:p>
-            <a:pPr indent="0" lvl="0" marL="914400" marR="0" rtl="0" algn="l">
-              <a:lnSpc>
-                <a:spcPct val="100000"/>
-              </a:lnSpc>
-              <a:spcBef>
-                <a:spcPts val="0"/>
-              </a:spcBef>
-              <a:spcAft>
-                <a:spcPts val="0"/>
-              </a:spcAft>
-              <a:buNone/>
-            </a:pPr>
-            <a:r>
-              <a:t/>
-            </a:r>
-            <a:endParaRPr sz="2300">
-              <a:solidFill>
-                <a:schemeClr val="dk1"/>
-              </a:solidFill>
-            </a:endParaRPr>
-          </a:p>
-          <a:p>
-            <a:pPr indent="-374650" lvl="1" marL="914400" marR="0" rtl="0" algn="l">
+            <a:pPr indent="-374650" lvl="2" marL="1371600" marR="0" rtl="0" algn="l">
               <a:lnSpc>
                 <a:spcPct val="100000"/>
               </a:lnSpc>
@@ -19164,7 +19222,7 @@
                 <a:schemeClr val="dk1"/>
               </a:buClr>
               <a:buSzPts val="2300"/>
-              <a:buChar char="○"/>
+              <a:buChar char="■"/>
             </a:pPr>
             <a:r>
               <a:rPr lang="en-US" sz="2300">
@@ -19172,7 +19230,7 @@
                   <a:schemeClr val="dk1"/>
                 </a:solidFill>
               </a:rPr>
-              <a:t>LRU - Least Recently Used</a:t>
+              <a:t>In the worst case, each page that is paged out could be the one that is referenced next</a:t>
             </a:r>
             <a:endParaRPr sz="2300">
               <a:solidFill>
@@ -19231,7 +19289,7 @@
       </p:grpSpPr>
       <p:sp>
         <p:nvSpPr>
-          <p:cNvPr id="197" name="Google Shape;197;g39ec7bcbe7a_0_86"/>
+          <p:cNvPr id="197" name="Google Shape;197;g39ec7bcbe7a_0_80"/>
           <p:cNvSpPr txBox="1"/>
           <p:nvPr/>
         </p:nvSpPr>
@@ -19277,7 +19335,7 @@
                   <a:schemeClr val="dk1"/>
                 </a:solidFill>
               </a:rPr>
-              <a:t>First In First Out (FIFO)</a:t>
+              <a:t>Least Recently Used (LRU)</a:t>
             </a:r>
             <a:endParaRPr b="0" i="0" sz="4000" u="none" cap="none" strike="noStrike">
               <a:solidFill>
@@ -19293,7 +19351,7 @@
       </p:sp>
       <p:sp>
         <p:nvSpPr>
-          <p:cNvPr id="198" name="Google Shape;198;g39ec7bcbe7a_0_86"/>
+          <p:cNvPr id="198" name="Google Shape;198;g39ec7bcbe7a_0_80"/>
           <p:cNvSpPr txBox="1"/>
           <p:nvPr/>
         </p:nvSpPr>
@@ -19359,7 +19417,7 @@
       </p:sp>
       <p:sp>
         <p:nvSpPr>
-          <p:cNvPr id="199" name="Google Shape;199;g39ec7bcbe7a_0_86"/>
+          <p:cNvPr id="199" name="Google Shape;199;g39ec7bcbe7a_0_80"/>
           <p:cNvSpPr txBox="1"/>
           <p:nvPr/>
         </p:nvSpPr>
@@ -19404,38 +19462,7 @@
                   <a:schemeClr val="dk1"/>
                 </a:solidFill>
               </a:rPr>
-              <a:t>Idea: The oldest page in physical memory is the one selected for replacement</a:t>
-            </a:r>
-            <a:endParaRPr sz="2300">
-              <a:solidFill>
-                <a:schemeClr val="dk1"/>
-              </a:solidFill>
-            </a:endParaRPr>
-          </a:p>
-          <a:p>
-            <a:pPr indent="-374650" lvl="0" marL="457200" marR="0" rtl="0" algn="l">
-              <a:lnSpc>
-                <a:spcPct val="100000"/>
-              </a:lnSpc>
-              <a:spcBef>
-                <a:spcPts val="0"/>
-              </a:spcBef>
-              <a:spcAft>
-                <a:spcPts val="0"/>
-              </a:spcAft>
-              <a:buClr>
-                <a:schemeClr val="dk1"/>
-              </a:buClr>
-              <a:buSzPts val="2300"/>
-              <a:buChar char="●"/>
-            </a:pPr>
-            <a:r>
-              <a:rPr lang="en-US" sz="2300">
-                <a:solidFill>
-                  <a:schemeClr val="dk1"/>
-                </a:solidFill>
-              </a:rPr>
-              <a:t>Extremely simple to implement</a:t>
+              <a:t>Idea: Replace the page in memory that has not been accessed for the longest time</a:t>
             </a:r>
             <a:endParaRPr sz="2300">
               <a:solidFill>
@@ -19466,100 +19493,23 @@
                   <a:schemeClr val="dk1"/>
                 </a:solidFill>
               </a:rPr>
-              <a:t>Keep a list</a:t>
+              <a:t>If a page wasn’t used recently, then it is </a:t>
             </a:r>
-            <a:endParaRPr sz="2300">
-              <a:solidFill>
-                <a:schemeClr val="dk1"/>
-              </a:solidFill>
-            </a:endParaRPr>
-          </a:p>
-          <a:p>
-            <a:pPr indent="-374650" lvl="2" marL="1371600" marR="0" rtl="0" algn="l">
-              <a:lnSpc>
-                <a:spcPct val="100000"/>
-              </a:lnSpc>
-              <a:spcBef>
-                <a:spcPts val="0"/>
-              </a:spcBef>
-              <a:spcAft>
-                <a:spcPts val="0"/>
-              </a:spcAft>
-              <a:buClr>
-                <a:schemeClr val="dk1"/>
-              </a:buClr>
-              <a:buSzPts val="2300"/>
-              <a:buChar char="■"/>
-            </a:pPr>
             <a:r>
               <a:rPr lang="en-US" sz="2300">
                 <a:solidFill>
                   <a:schemeClr val="dk1"/>
                 </a:solidFill>
               </a:rPr>
-              <a:t>Victims are chosen from the tail</a:t>
+              <a:t>unlikely</a:t>
             </a:r>
-            <a:endParaRPr sz="2300">
-              <a:solidFill>
-                <a:schemeClr val="dk1"/>
-              </a:solidFill>
-            </a:endParaRPr>
-          </a:p>
-          <a:p>
-            <a:pPr indent="-374650" lvl="2" marL="1371600" marR="0" rtl="0" algn="l">
-              <a:lnSpc>
-                <a:spcPct val="100000"/>
-              </a:lnSpc>
-              <a:spcBef>
-                <a:spcPts val="0"/>
-              </a:spcBef>
-              <a:spcAft>
-                <a:spcPts val="0"/>
-              </a:spcAft>
-              <a:buClr>
-                <a:schemeClr val="dk1"/>
-              </a:buClr>
-              <a:buSzPts val="2300"/>
-              <a:buChar char="■"/>
-            </a:pPr>
             <a:r>
               <a:rPr lang="en-US" sz="2300">
                 <a:solidFill>
                   <a:schemeClr val="dk1"/>
                 </a:solidFill>
               </a:rPr>
-              <a:t>New pages are placed on the head</a:t>
-            </a:r>
-            <a:endParaRPr sz="2300">
-              <a:solidFill>
-                <a:schemeClr val="dk1"/>
-              </a:solidFill>
-            </a:endParaRPr>
-          </a:p>
-          <a:p>
-            <a:pPr indent="-374650" lvl="0" marL="457200" marR="0" rtl="0" algn="l">
-              <a:lnSpc>
-                <a:spcPct val="100000"/>
-              </a:lnSpc>
-              <a:spcBef>
-                <a:spcPts val="0"/>
-              </a:spcBef>
-              <a:spcAft>
-                <a:spcPts val="0"/>
-              </a:spcAft>
-              <a:buClr>
-                <a:schemeClr val="dk1"/>
-              </a:buClr>
-              <a:buSzPts val="2300"/>
-              <a:buChar char="●"/>
-            </a:pPr>
-            <a:r>
-              <a:rPr lang="en-US" sz="2300">
-                <a:solidFill>
-                  <a:schemeClr val="dk1"/>
-                </a:solidFill>
-              </a:rPr>
-              <a:t>Performance can be poor</a:t>
+              <a:t> to be used again in the near future</a:t>
             </a:r>
             <a:endParaRPr sz="2300">
               <a:solidFill>
@@ -19590,7 +19540,7 @@
                   <a:schemeClr val="dk1"/>
                 </a:solidFill>
               </a:rPr>
-              <a:t>FIFO does not consider page usage</a:t>
+              <a:t>If a page was used recently, then it is likely to be used again in the near future</a:t>
             </a:r>
             <a:endParaRPr sz="2300">
               <a:solidFill>
@@ -19599,7 +19549,7 @@
             </a:endParaRPr>
           </a:p>
           <a:p>
-            <a:pPr indent="-374650" lvl="2" marL="1371600" marR="0" rtl="0" algn="l">
+            <a:pPr indent="-374650" lvl="1" marL="914400" marR="0" rtl="0" algn="l">
               <a:lnSpc>
                 <a:spcPct val="100000"/>
               </a:lnSpc>
@@ -19613,7 +19563,7 @@
                 <a:schemeClr val="dk1"/>
               </a:buClr>
               <a:buSzPts val="2300"/>
-              <a:buChar char="■"/>
+              <a:buChar char="○"/>
             </a:pPr>
             <a:r>
               <a:rPr lang="en-US" sz="2300">
@@ -19621,29 +19571,7 @@
                   <a:schemeClr val="dk1"/>
                 </a:solidFill>
               </a:rPr>
-              <a:t>In the worst case, each page that is paged out could be the one that is referenced next</a:t>
-            </a:r>
-            <a:endParaRPr sz="2300">
-              <a:solidFill>
-                <a:schemeClr val="dk1"/>
-              </a:solidFill>
-            </a:endParaRPr>
-          </a:p>
-          <a:p>
-            <a:pPr indent="0" lvl="0" marL="0" marR="0" rtl="0" algn="l">
-              <a:lnSpc>
-                <a:spcPct val="100000"/>
-              </a:lnSpc>
-              <a:spcBef>
-                <a:spcPts val="0"/>
-              </a:spcBef>
-              <a:spcAft>
-                <a:spcPts val="0"/>
-              </a:spcAft>
-              <a:buNone/>
-            </a:pPr>
-            <a:r>
-              <a:t/>
+              <a:t>Select victim that was used least recently</a:t>
             </a:r>
             <a:endParaRPr sz="2300">
               <a:solidFill>
@@ -19680,7 +19608,7 @@
       </p:grpSpPr>
       <p:sp>
         <p:nvSpPr>
-          <p:cNvPr id="204" name="Google Shape;204;g39ec7bcbe7a_0_80"/>
+          <p:cNvPr id="204" name="Google Shape;204;g39ec7bcbe7a_0_92"/>
           <p:cNvSpPr txBox="1"/>
           <p:nvPr/>
         </p:nvSpPr>
@@ -19726,7 +19654,7 @@
                   <a:schemeClr val="dk1"/>
                 </a:solidFill>
               </a:rPr>
-              <a:t>Least Recently Used (LRU)</a:t>
+              <a:t>LRU Example</a:t>
             </a:r>
             <a:endParaRPr b="0" i="0" sz="4000" u="none" cap="none" strike="noStrike">
               <a:solidFill>
@@ -19742,7 +19670,7 @@
       </p:sp>
       <p:sp>
         <p:nvSpPr>
-          <p:cNvPr id="205" name="Google Shape;205;g39ec7bcbe7a_0_80"/>
+          <p:cNvPr id="205" name="Google Shape;205;g39ec7bcbe7a_0_92"/>
           <p:cNvSpPr txBox="1"/>
           <p:nvPr/>
         </p:nvSpPr>
@@ -19808,326 +19736,7 @@
       </p:sp>
       <p:sp>
         <p:nvSpPr>
-          <p:cNvPr id="206" name="Google Shape;206;g39ec7bcbe7a_0_80"/>
-          <p:cNvSpPr txBox="1"/>
-          <p:nvPr/>
-        </p:nvSpPr>
-        <p:spPr>
-          <a:xfrm>
-            <a:off x="480800" y="1129725"/>
-            <a:ext cx="8549700" cy="4698900"/>
-          </a:xfrm>
-          <a:prstGeom prst="rect">
-            <a:avLst/>
-          </a:prstGeom>
-          <a:noFill/>
-          <a:ln>
-            <a:noFill/>
-          </a:ln>
-        </p:spPr>
-        <p:txBody>
-          <a:bodyPr anchorCtr="0" anchor="t" bIns="91425" lIns="91425" spcFirstLastPara="1" rIns="91425" wrap="square" tIns="91425">
-            <a:noAutofit/>
-          </a:bodyPr>
-          <a:lstStyle/>
-          <a:p>
-            <a:pPr indent="-374650" lvl="0" marL="457200" marR="0" rtl="0" algn="l">
-              <a:lnSpc>
-                <a:spcPct val="100000"/>
-              </a:lnSpc>
-              <a:spcBef>
-                <a:spcPts val="0"/>
-              </a:spcBef>
-              <a:spcAft>
-                <a:spcPts val="0"/>
-              </a:spcAft>
-              <a:buClr>
-                <a:schemeClr val="dk1"/>
-              </a:buClr>
-              <a:buSzPts val="2300"/>
-              <a:buChar char="●"/>
-            </a:pPr>
-            <a:r>
-              <a:rPr lang="en-US" sz="2300">
-                <a:solidFill>
-                  <a:schemeClr val="dk1"/>
-                </a:solidFill>
-              </a:rPr>
-              <a:t>Idea: Replace the page in memory that has not been accessed for the longest time</a:t>
-            </a:r>
-            <a:endParaRPr sz="2300">
-              <a:solidFill>
-                <a:schemeClr val="dk1"/>
-              </a:solidFill>
-            </a:endParaRPr>
-          </a:p>
-          <a:p>
-            <a:pPr indent="-374650" lvl="1" marL="914400" marR="0" rtl="0" algn="l">
-              <a:lnSpc>
-                <a:spcPct val="100000"/>
-              </a:lnSpc>
-              <a:spcBef>
-                <a:spcPts val="0"/>
-              </a:spcBef>
-              <a:spcAft>
-                <a:spcPts val="0"/>
-              </a:spcAft>
-              <a:buClr>
-                <a:schemeClr val="dk1"/>
-              </a:buClr>
-              <a:buSzPts val="2300"/>
-              <a:buChar char="○"/>
-            </a:pPr>
-            <a:r>
-              <a:rPr lang="en-US" sz="2300">
-                <a:solidFill>
-                  <a:schemeClr val="dk1"/>
-                </a:solidFill>
-              </a:rPr>
-              <a:t>If a page wasn’t used recently, then it is </a:t>
-            </a:r>
-            <a:r>
-              <a:rPr lang="en-US" sz="2300">
-                <a:solidFill>
-                  <a:schemeClr val="dk1"/>
-                </a:solidFill>
-              </a:rPr>
-              <a:t>unlikely</a:t>
-            </a:r>
-            <a:r>
-              <a:rPr lang="en-US" sz="2300">
-                <a:solidFill>
-                  <a:schemeClr val="dk1"/>
-                </a:solidFill>
-              </a:rPr>
-              <a:t> to be used again in the near future</a:t>
-            </a:r>
-            <a:endParaRPr sz="2300">
-              <a:solidFill>
-                <a:schemeClr val="dk1"/>
-              </a:solidFill>
-            </a:endParaRPr>
-          </a:p>
-          <a:p>
-            <a:pPr indent="-374650" lvl="1" marL="914400" marR="0" rtl="0" algn="l">
-              <a:lnSpc>
-                <a:spcPct val="100000"/>
-              </a:lnSpc>
-              <a:spcBef>
-                <a:spcPts val="0"/>
-              </a:spcBef>
-              <a:spcAft>
-                <a:spcPts val="0"/>
-              </a:spcAft>
-              <a:buClr>
-                <a:schemeClr val="dk1"/>
-              </a:buClr>
-              <a:buSzPts val="2300"/>
-              <a:buChar char="○"/>
-            </a:pPr>
-            <a:r>
-              <a:rPr lang="en-US" sz="2300">
-                <a:solidFill>
-                  <a:schemeClr val="dk1"/>
-                </a:solidFill>
-              </a:rPr>
-              <a:t>If a page was used recently, then it is likely to be used again in the near future</a:t>
-            </a:r>
-            <a:endParaRPr sz="2300">
-              <a:solidFill>
-                <a:schemeClr val="dk1"/>
-              </a:solidFill>
-            </a:endParaRPr>
-          </a:p>
-          <a:p>
-            <a:pPr indent="-374650" lvl="1" marL="914400" marR="0" rtl="0" algn="l">
-              <a:lnSpc>
-                <a:spcPct val="100000"/>
-              </a:lnSpc>
-              <a:spcBef>
-                <a:spcPts val="0"/>
-              </a:spcBef>
-              <a:spcAft>
-                <a:spcPts val="0"/>
-              </a:spcAft>
-              <a:buClr>
-                <a:schemeClr val="dk1"/>
-              </a:buClr>
-              <a:buSzPts val="2300"/>
-              <a:buChar char="○"/>
-            </a:pPr>
-            <a:r>
-              <a:rPr lang="en-US" sz="2300">
-                <a:solidFill>
-                  <a:schemeClr val="dk1"/>
-                </a:solidFill>
-              </a:rPr>
-              <a:t>Select victim that was used least recently</a:t>
-            </a:r>
-            <a:endParaRPr sz="2300">
-              <a:solidFill>
-                <a:schemeClr val="dk1"/>
-              </a:solidFill>
-            </a:endParaRPr>
-          </a:p>
-        </p:txBody>
-      </p:sp>
-    </p:spTree>
-  </p:cSld>
-  <p:clrMapOvr>
-    <a:masterClrMapping/>
-  </p:clrMapOvr>
-</p:sld>
-</file>
-
-<file path=ppt/slides/slide18.xml><?xml version="1.0" encoding="utf-8"?>
-<p:sld xmlns:a="http://schemas.openxmlformats.org/drawingml/2006/main" xmlns:r="http://schemas.openxmlformats.org/officeDocument/2006/relationships" xmlns:mc="http://schemas.openxmlformats.org/markup-compatibility/2006" xmlns:mv="urn:schemas-microsoft-com:mac:vml" xmlns:p="http://schemas.openxmlformats.org/presentationml/2006/main" xmlns:c="http://schemas.openxmlformats.org/drawingml/2006/chart" xmlns:dgm="http://schemas.openxmlformats.org/drawingml/2006/diagram" xmlns:o="urn:schemas-microsoft-com:office:office" xmlns:v="urn:schemas-microsoft-com:vml" xmlns:pvml="urn:schemas-microsoft-com:office:powerpoint" xmlns:com="http://schemas.openxmlformats.org/drawingml/2006/compatibility" xmlns:p14="http://schemas.microsoft.com/office/powerpoint/2010/main" xmlns:p15="http://schemas.microsoft.com/office/powerpoint/2012/main" xmlns:ahyp="http://schemas.microsoft.com/office/drawing/2018/hyperlinkcolor">
-  <p:cSld>
-    <p:spTree>
-      <p:nvGrpSpPr>
-        <p:cNvPr id="210" name="Shape 210"/>
-        <p:cNvGrpSpPr/>
-        <p:nvPr/>
-      </p:nvGrpSpPr>
-      <p:grpSpPr>
-        <a:xfrm>
-          <a:off x="0" y="0"/>
-          <a:ext cx="0" cy="0"/>
-          <a:chOff x="0" y="0"/>
-          <a:chExt cx="0" cy="0"/>
-        </a:xfrm>
-      </p:grpSpPr>
-      <p:sp>
-        <p:nvSpPr>
-          <p:cNvPr id="211" name="Google Shape;211;g39ec7bcbe7a_0_92"/>
-          <p:cNvSpPr txBox="1"/>
-          <p:nvPr/>
-        </p:nvSpPr>
-        <p:spPr>
-          <a:xfrm>
-            <a:off x="457200" y="228600"/>
-            <a:ext cx="8686800" cy="708000"/>
-          </a:xfrm>
-          <a:prstGeom prst="rect">
-            <a:avLst/>
-          </a:prstGeom>
-          <a:noFill/>
-          <a:ln>
-            <a:noFill/>
-          </a:ln>
-        </p:spPr>
-        <p:txBody>
-          <a:bodyPr anchorCtr="0" anchor="t" bIns="45700" lIns="91425" spcFirstLastPara="1" rIns="91425" wrap="square" tIns="45700">
-            <a:spAutoFit/>
-          </a:bodyPr>
-          <a:lstStyle/>
-          <a:p>
-            <a:pPr indent="0" lvl="0" marL="0" marR="0" rtl="0" algn="l">
-              <a:lnSpc>
-                <a:spcPct val="100000"/>
-              </a:lnSpc>
-              <a:spcBef>
-                <a:spcPts val="0"/>
-              </a:spcBef>
-              <a:spcAft>
-                <a:spcPts val="0"/>
-              </a:spcAft>
-              <a:buClr>
-                <a:schemeClr val="dk1"/>
-              </a:buClr>
-              <a:buSzPts val="4000"/>
-              <a:buFont typeface="Arial"/>
-              <a:buNone/>
-            </a:pPr>
-            <a:r>
-              <a:rPr lang="en-US" sz="4000">
-                <a:solidFill>
-                  <a:schemeClr val="dk1"/>
-                </a:solidFill>
-              </a:rPr>
-              <a:t>LRU Example</a:t>
-            </a:r>
-            <a:endParaRPr b="0" i="0" sz="4000" u="none" cap="none" strike="noStrike">
-              <a:solidFill>
-                <a:schemeClr val="dk1"/>
-              </a:solidFill>
-              <a:latin typeface="Arial"/>
-              <a:ea typeface="Arial"/>
-              <a:cs typeface="Arial"/>
-              <a:sym typeface="Arial"/>
-            </a:endParaRPr>
-          </a:p>
-        </p:txBody>
-      </p:sp>
-      <p:sp>
-        <p:nvSpPr>
-          <p:cNvPr id="212" name="Google Shape;212;g39ec7bcbe7a_0_92"/>
-          <p:cNvSpPr txBox="1"/>
-          <p:nvPr/>
-        </p:nvSpPr>
-        <p:spPr>
-          <a:xfrm>
-            <a:off x="5808000" y="6389100"/>
-            <a:ext cx="3336000" cy="468900"/>
-          </a:xfrm>
-          <a:prstGeom prst="rect">
-            <a:avLst/>
-          </a:prstGeom>
-          <a:noFill/>
-          <a:ln>
-            <a:noFill/>
-          </a:ln>
-        </p:spPr>
-        <p:txBody>
-          <a:bodyPr anchorCtr="0" anchor="t" bIns="91425" lIns="91425" spcFirstLastPara="1" rIns="91425" wrap="square" tIns="91425">
-            <a:noAutofit/>
-          </a:bodyPr>
-          <a:lstStyle/>
-          <a:p>
-            <a:pPr indent="0" lvl="0" marL="0" marR="0" rtl="0" algn="l">
-              <a:lnSpc>
-                <a:spcPct val="100000"/>
-              </a:lnSpc>
-              <a:spcBef>
-                <a:spcPts val="0"/>
-              </a:spcBef>
-              <a:spcAft>
-                <a:spcPts val="0"/>
-              </a:spcAft>
-              <a:buClr>
-                <a:srgbClr val="000000"/>
-              </a:buClr>
-              <a:buSzPts val="1800"/>
-              <a:buFont typeface="Arial"/>
-              <a:buNone/>
-            </a:pPr>
-            <a:r>
-              <a:rPr b="1" i="0" lang="en-US" sz="1800" u="none" cap="none" strike="noStrike">
-                <a:solidFill>
-                  <a:schemeClr val="lt1"/>
-                </a:solidFill>
-                <a:latin typeface="Arial"/>
-                <a:ea typeface="Arial"/>
-                <a:cs typeface="Arial"/>
-                <a:sym typeface="Arial"/>
-              </a:rPr>
-              <a:t>https://tinyurl.com/CSCI3753</a:t>
-            </a:r>
-            <a:endParaRPr b="0" i="0" sz="2300" u="none" cap="none" strike="noStrike">
-              <a:solidFill>
-                <a:schemeClr val="lt1"/>
-              </a:solidFill>
-              <a:latin typeface="Arial Black"/>
-              <a:ea typeface="Arial Black"/>
-              <a:cs typeface="Arial Black"/>
-              <a:sym typeface="Arial Black"/>
-            </a:endParaRPr>
-          </a:p>
-        </p:txBody>
-      </p:sp>
-      <p:sp>
-        <p:nvSpPr>
-          <p:cNvPr id="213" name="Google Shape;213;g39ec7bcbe7a_0_92"/>
+          <p:cNvPr id="206" name="Google Shape;206;g39ec7bcbe7a_0_92"/>
           <p:cNvSpPr txBox="1"/>
           <p:nvPr/>
         </p:nvSpPr>
@@ -20215,7 +19824,7 @@
       </p:sp>
       <p:pic>
         <p:nvPicPr>
-          <p:cNvPr id="214" name="Google Shape;214;g39ec7bcbe7a_0_92" title="Screenshot 2025-10-30 at 5.39.46 PM.png"/>
+          <p:cNvPr id="207" name="Google Shape;207;g39ec7bcbe7a_0_92" title="Screenshot 2025-10-30 at 5.39.46 PM.png"/>
           <p:cNvPicPr preferRelativeResize="0"/>
           <p:nvPr/>
         </p:nvPicPr>
@@ -20243,7 +19852,7 @@
       </p:pic>
       <p:pic>
         <p:nvPicPr>
-          <p:cNvPr id="215" name="Google Shape;215;g39ec7bcbe7a_0_92" title="Screenshot 2025-10-30 at 5.39.46 PM.png"/>
+          <p:cNvPr id="208" name="Google Shape;208;g39ec7bcbe7a_0_92" title="Screenshot 2025-10-30 at 5.39.46 PM.png"/>
           <p:cNvPicPr preferRelativeResize="0"/>
           <p:nvPr/>
         </p:nvPicPr>
@@ -20271,7 +19880,7 @@
       </p:pic>
       <p:pic>
         <p:nvPicPr>
-          <p:cNvPr id="216" name="Google Shape;216;g39ec7bcbe7a_0_92" title="Screenshot 2025-10-30 at 5.39.46 PM.png"/>
+          <p:cNvPr id="209" name="Google Shape;209;g39ec7bcbe7a_0_92" title="Screenshot 2025-10-30 at 5.39.46 PM.png"/>
           <p:cNvPicPr preferRelativeResize="0"/>
           <p:nvPr/>
         </p:nvPicPr>
@@ -20299,7 +19908,7 @@
       </p:pic>
       <p:pic>
         <p:nvPicPr>
-          <p:cNvPr id="217" name="Google Shape;217;g39ec7bcbe7a_0_92" title="Screenshot 2025-10-30 at 5.39.46 PM.png"/>
+          <p:cNvPr id="210" name="Google Shape;210;g39ec7bcbe7a_0_92" title="Screenshot 2025-10-30 at 5.39.46 PM.png"/>
           <p:cNvPicPr preferRelativeResize="0"/>
           <p:nvPr/>
         </p:nvPicPr>
@@ -20327,7 +19936,7 @@
       </p:pic>
       <p:pic>
         <p:nvPicPr>
-          <p:cNvPr id="218" name="Google Shape;218;g39ec7bcbe7a_0_92" title="Screenshot 2025-10-30 at 5.39.46 PM.png"/>
+          <p:cNvPr id="211" name="Google Shape;211;g39ec7bcbe7a_0_92" title="Screenshot 2025-10-30 at 5.39.46 PM.png"/>
           <p:cNvPicPr preferRelativeResize="0"/>
           <p:nvPr/>
         </p:nvPicPr>
@@ -20355,7 +19964,7 @@
       </p:pic>
       <p:pic>
         <p:nvPicPr>
-          <p:cNvPr id="219" name="Google Shape;219;g39ec7bcbe7a_0_92" title="Screenshot 2025-10-30 at 5.39.46 PM.png"/>
+          <p:cNvPr id="212" name="Google Shape;212;g39ec7bcbe7a_0_92" title="Screenshot 2025-10-30 at 5.39.46 PM.png"/>
           <p:cNvPicPr preferRelativeResize="0"/>
           <p:nvPr/>
         </p:nvPicPr>
@@ -20383,7 +19992,7 @@
       </p:pic>
       <p:pic>
         <p:nvPicPr>
-          <p:cNvPr id="220" name="Google Shape;220;g39ec7bcbe7a_0_92" title="Screenshot 2025-10-30 at 5.39.46 PM.png"/>
+          <p:cNvPr id="213" name="Google Shape;213;g39ec7bcbe7a_0_92" title="Screenshot 2025-10-30 at 5.39.46 PM.png"/>
           <p:cNvPicPr preferRelativeResize="0"/>
           <p:nvPr/>
         </p:nvPicPr>
@@ -20411,7 +20020,7 @@
       </p:pic>
       <p:pic>
         <p:nvPicPr>
-          <p:cNvPr id="221" name="Google Shape;221;g39ec7bcbe7a_0_92" title="Screenshot 2025-10-30 at 5.39.46 PM.png"/>
+          <p:cNvPr id="214" name="Google Shape;214;g39ec7bcbe7a_0_92" title="Screenshot 2025-10-30 at 5.39.46 PM.png"/>
           <p:cNvPicPr preferRelativeResize="0"/>
           <p:nvPr/>
         </p:nvPicPr>
@@ -20439,7 +20048,7 @@
       </p:pic>
       <p:pic>
         <p:nvPicPr>
-          <p:cNvPr id="222" name="Google Shape;222;g39ec7bcbe7a_0_92" title="Screenshot 2025-10-30 at 5.39.46 PM.png"/>
+          <p:cNvPr id="215" name="Google Shape;215;g39ec7bcbe7a_0_92" title="Screenshot 2025-10-30 at 5.39.46 PM.png"/>
           <p:cNvPicPr preferRelativeResize="0"/>
           <p:nvPr/>
         </p:nvPicPr>
@@ -20467,7 +20076,7 @@
       </p:pic>
       <p:pic>
         <p:nvPicPr>
-          <p:cNvPr id="223" name="Google Shape;223;g39ec7bcbe7a_0_92" title="Screenshot 2025-10-30 at 5.39.46 PM.png"/>
+          <p:cNvPr id="216" name="Google Shape;216;g39ec7bcbe7a_0_92" title="Screenshot 2025-10-30 at 5.39.46 PM.png"/>
           <p:cNvPicPr preferRelativeResize="0"/>
           <p:nvPr/>
         </p:nvPicPr>
@@ -20495,7 +20104,7 @@
       </p:pic>
       <p:pic>
         <p:nvPicPr>
-          <p:cNvPr id="224" name="Google Shape;224;g39ec7bcbe7a_0_92" title="Screenshot 2025-10-30 at 5.39.46 PM.png"/>
+          <p:cNvPr id="217" name="Google Shape;217;g39ec7bcbe7a_0_92" title="Screenshot 2025-10-30 at 5.39.46 PM.png"/>
           <p:cNvPicPr preferRelativeResize="0"/>
           <p:nvPr/>
         </p:nvPicPr>
@@ -20523,7 +20132,7 @@
       </p:pic>
       <p:pic>
         <p:nvPicPr>
-          <p:cNvPr id="225" name="Google Shape;225;g39ec7bcbe7a_0_92" title="Screenshot 2025-10-30 at 5.39.46 PM.png"/>
+          <p:cNvPr id="218" name="Google Shape;218;g39ec7bcbe7a_0_92" title="Screenshot 2025-10-30 at 5.39.46 PM.png"/>
           <p:cNvPicPr preferRelativeResize="0"/>
           <p:nvPr/>
         </p:nvPicPr>
@@ -20551,7 +20160,7 @@
       </p:pic>
       <p:pic>
         <p:nvPicPr>
-          <p:cNvPr id="226" name="Google Shape;226;g39ec7bcbe7a_0_92" title="Screenshot 2025-10-30 at 5.39.46 PM.png"/>
+          <p:cNvPr id="219" name="Google Shape;219;g39ec7bcbe7a_0_92" title="Screenshot 2025-10-30 at 5.39.46 PM.png"/>
           <p:cNvPicPr preferRelativeResize="0"/>
           <p:nvPr/>
         </p:nvPicPr>
@@ -20579,7 +20188,7 @@
       </p:pic>
       <p:pic>
         <p:nvPicPr>
-          <p:cNvPr id="227" name="Google Shape;227;g39ec7bcbe7a_0_92" title="Screenshot 2025-10-30 at 5.39.46 PM.png"/>
+          <p:cNvPr id="220" name="Google Shape;220;g39ec7bcbe7a_0_92" title="Screenshot 2025-10-30 at 5.39.46 PM.png"/>
           <p:cNvPicPr preferRelativeResize="0"/>
           <p:nvPr/>
         </p:nvPicPr>
@@ -20607,7 +20216,7 @@
       </p:pic>
       <p:pic>
         <p:nvPicPr>
-          <p:cNvPr id="228" name="Google Shape;228;g39ec7bcbe7a_0_92" title="Screenshot 2025-10-30 at 5.39.46 PM.png"/>
+          <p:cNvPr id="221" name="Google Shape;221;g39ec7bcbe7a_0_92" title="Screenshot 2025-10-30 at 5.39.46 PM.png"/>
           <p:cNvPicPr preferRelativeResize="0"/>
           <p:nvPr/>
         </p:nvPicPr>
@@ -20635,7 +20244,7 @@
       </p:pic>
       <p:pic>
         <p:nvPicPr>
-          <p:cNvPr id="229" name="Google Shape;229;g39ec7bcbe7a_0_92" title="Screenshot 2025-10-30 at 5.39.46 PM.png"/>
+          <p:cNvPr id="222" name="Google Shape;222;g39ec7bcbe7a_0_92" title="Screenshot 2025-10-30 at 5.39.46 PM.png"/>
           <p:cNvPicPr preferRelativeResize="0"/>
           <p:nvPr/>
         </p:nvPicPr>
@@ -20663,7 +20272,7 @@
       </p:pic>
       <p:pic>
         <p:nvPicPr>
-          <p:cNvPr id="230" name="Google Shape;230;g39ec7bcbe7a_0_92" title="Screenshot 2025-10-30 at 5.39.46 PM.png"/>
+          <p:cNvPr id="223" name="Google Shape;223;g39ec7bcbe7a_0_92" title="Screenshot 2025-10-30 at 5.39.46 PM.png"/>
           <p:cNvPicPr preferRelativeResize="0"/>
           <p:nvPr/>
         </p:nvPicPr>
@@ -20691,7 +20300,7 @@
       </p:pic>
       <p:pic>
         <p:nvPicPr>
-          <p:cNvPr id="231" name="Google Shape;231;g39ec7bcbe7a_0_92" title="Screenshot 2025-10-30 at 5.39.46 PM.png"/>
+          <p:cNvPr id="224" name="Google Shape;224;g39ec7bcbe7a_0_92" title="Screenshot 2025-10-30 at 5.39.46 PM.png"/>
           <p:cNvPicPr preferRelativeResize="0"/>
           <p:nvPr/>
         </p:nvPicPr>
@@ -20719,7 +20328,7 @@
       </p:pic>
       <p:pic>
         <p:nvPicPr>
-          <p:cNvPr id="232" name="Google Shape;232;g39ec7bcbe7a_0_92" title="Screenshot 2025-10-30 at 5.39.46 PM.png"/>
+          <p:cNvPr id="225" name="Google Shape;225;g39ec7bcbe7a_0_92" title="Screenshot 2025-10-30 at 5.39.46 PM.png"/>
           <p:cNvPicPr preferRelativeResize="0"/>
           <p:nvPr/>
         </p:nvPicPr>
@@ -20747,7 +20356,7 @@
       </p:pic>
       <p:sp>
         <p:nvSpPr>
-          <p:cNvPr id="233" name="Google Shape;233;g39ec7bcbe7a_0_92"/>
+          <p:cNvPr id="226" name="Google Shape;226;g39ec7bcbe7a_0_92"/>
           <p:cNvSpPr txBox="1"/>
           <p:nvPr/>
         </p:nvSpPr>
@@ -20805,7 +20414,7 @@
       </p:sp>
       <p:sp>
         <p:nvSpPr>
-          <p:cNvPr id="234" name="Google Shape;234;g39ec7bcbe7a_0_92"/>
+          <p:cNvPr id="227" name="Google Shape;227;g39ec7bcbe7a_0_92"/>
           <p:cNvSpPr txBox="1"/>
           <p:nvPr/>
         </p:nvSpPr>
@@ -20863,7 +20472,7 @@
       </p:sp>
       <p:sp>
         <p:nvSpPr>
-          <p:cNvPr id="235" name="Google Shape;235;g39ec7bcbe7a_0_92"/>
+          <p:cNvPr id="228" name="Google Shape;228;g39ec7bcbe7a_0_92"/>
           <p:cNvSpPr txBox="1"/>
           <p:nvPr/>
         </p:nvSpPr>
@@ -20921,7 +20530,7 @@
       </p:sp>
       <p:sp>
         <p:nvSpPr>
-          <p:cNvPr id="236" name="Google Shape;236;g39ec7bcbe7a_0_92"/>
+          <p:cNvPr id="229" name="Google Shape;229;g39ec7bcbe7a_0_92"/>
           <p:cNvSpPr txBox="1"/>
           <p:nvPr/>
         </p:nvSpPr>
@@ -20979,7 +20588,7 @@
       </p:sp>
       <p:sp>
         <p:nvSpPr>
-          <p:cNvPr id="237" name="Google Shape;237;g39ec7bcbe7a_0_92"/>
+          <p:cNvPr id="230" name="Google Shape;230;g39ec7bcbe7a_0_92"/>
           <p:cNvSpPr txBox="1"/>
           <p:nvPr/>
         </p:nvSpPr>
@@ -21037,7 +20646,7 @@
       </p:sp>
       <p:sp>
         <p:nvSpPr>
-          <p:cNvPr id="238" name="Google Shape;238;g39ec7bcbe7a_0_92"/>
+          <p:cNvPr id="231" name="Google Shape;231;g39ec7bcbe7a_0_92"/>
           <p:cNvSpPr txBox="1"/>
           <p:nvPr/>
         </p:nvSpPr>
@@ -21095,7 +20704,7 @@
       </p:sp>
       <p:sp>
         <p:nvSpPr>
-          <p:cNvPr id="239" name="Google Shape;239;g39ec7bcbe7a_0_92"/>
+          <p:cNvPr id="232" name="Google Shape;232;g39ec7bcbe7a_0_92"/>
           <p:cNvSpPr txBox="1"/>
           <p:nvPr/>
         </p:nvSpPr>
@@ -21153,7 +20762,7 @@
       </p:sp>
       <p:sp>
         <p:nvSpPr>
-          <p:cNvPr id="240" name="Google Shape;240;g39ec7bcbe7a_0_92"/>
+          <p:cNvPr id="233" name="Google Shape;233;g39ec7bcbe7a_0_92"/>
           <p:cNvSpPr txBox="1"/>
           <p:nvPr/>
         </p:nvSpPr>
@@ -21211,7 +20820,7 @@
       </p:sp>
       <p:sp>
         <p:nvSpPr>
-          <p:cNvPr id="241" name="Google Shape;241;g39ec7bcbe7a_0_92"/>
+          <p:cNvPr id="234" name="Google Shape;234;g39ec7bcbe7a_0_92"/>
           <p:cNvSpPr txBox="1"/>
           <p:nvPr/>
         </p:nvSpPr>
@@ -21269,7 +20878,7 @@
       </p:sp>
       <p:sp>
         <p:nvSpPr>
-          <p:cNvPr id="242" name="Google Shape;242;g39ec7bcbe7a_0_92"/>
+          <p:cNvPr id="235" name="Google Shape;235;g39ec7bcbe7a_0_92"/>
           <p:cNvSpPr txBox="1"/>
           <p:nvPr/>
         </p:nvSpPr>
@@ -21327,7 +20936,7 @@
       </p:sp>
       <p:sp>
         <p:nvSpPr>
-          <p:cNvPr id="243" name="Google Shape;243;g39ec7bcbe7a_0_92"/>
+          <p:cNvPr id="236" name="Google Shape;236;g39ec7bcbe7a_0_92"/>
           <p:cNvSpPr txBox="1"/>
           <p:nvPr/>
         </p:nvSpPr>
@@ -21385,7 +20994,7 @@
       </p:sp>
       <p:sp>
         <p:nvSpPr>
-          <p:cNvPr id="244" name="Google Shape;244;g39ec7bcbe7a_0_92"/>
+          <p:cNvPr id="237" name="Google Shape;237;g39ec7bcbe7a_0_92"/>
           <p:cNvSpPr txBox="1"/>
           <p:nvPr/>
         </p:nvSpPr>
@@ -21443,7 +21052,7 @@
       </p:sp>
       <p:sp>
         <p:nvSpPr>
-          <p:cNvPr id="245" name="Google Shape;245;g39ec7bcbe7a_0_92"/>
+          <p:cNvPr id="238" name="Google Shape;238;g39ec7bcbe7a_0_92"/>
           <p:cNvSpPr txBox="1"/>
           <p:nvPr/>
         </p:nvSpPr>
@@ -21501,7 +21110,7 @@
       </p:sp>
       <p:sp>
         <p:nvSpPr>
-          <p:cNvPr id="246" name="Google Shape;246;g39ec7bcbe7a_0_92"/>
+          <p:cNvPr id="239" name="Google Shape;239;g39ec7bcbe7a_0_92"/>
           <p:cNvSpPr txBox="1"/>
           <p:nvPr/>
         </p:nvSpPr>
@@ -21559,7 +21168,7 @@
       </p:sp>
       <p:sp>
         <p:nvSpPr>
-          <p:cNvPr id="247" name="Google Shape;247;g39ec7bcbe7a_0_92"/>
+          <p:cNvPr id="240" name="Google Shape;240;g39ec7bcbe7a_0_92"/>
           <p:cNvSpPr txBox="1"/>
           <p:nvPr/>
         </p:nvSpPr>
@@ -21617,7 +21226,7 @@
       </p:sp>
       <p:sp>
         <p:nvSpPr>
-          <p:cNvPr id="248" name="Google Shape;248;g39ec7bcbe7a_0_92"/>
+          <p:cNvPr id="241" name="Google Shape;241;g39ec7bcbe7a_0_92"/>
           <p:cNvSpPr txBox="1"/>
           <p:nvPr/>
         </p:nvSpPr>
@@ -21675,7 +21284,7 @@
       </p:sp>
       <p:sp>
         <p:nvSpPr>
-          <p:cNvPr id="249" name="Google Shape;249;g39ec7bcbe7a_0_92"/>
+          <p:cNvPr id="242" name="Google Shape;242;g39ec7bcbe7a_0_92"/>
           <p:cNvSpPr txBox="1"/>
           <p:nvPr/>
         </p:nvSpPr>
@@ -21733,7 +21342,7 @@
       </p:sp>
       <p:sp>
         <p:nvSpPr>
-          <p:cNvPr id="250" name="Google Shape;250;g39ec7bcbe7a_0_92"/>
+          <p:cNvPr id="243" name="Google Shape;243;g39ec7bcbe7a_0_92"/>
           <p:cNvSpPr txBox="1"/>
           <p:nvPr/>
         </p:nvSpPr>
@@ -21791,7 +21400,7 @@
       </p:sp>
       <p:sp>
         <p:nvSpPr>
-          <p:cNvPr id="251" name="Google Shape;251;g39ec7bcbe7a_0_92"/>
+          <p:cNvPr id="244" name="Google Shape;244;g39ec7bcbe7a_0_92"/>
           <p:cNvSpPr txBox="1"/>
           <p:nvPr/>
         </p:nvSpPr>
@@ -21841,7 +21450,7 @@
       </p:sp>
       <p:sp>
         <p:nvSpPr>
-          <p:cNvPr id="252" name="Google Shape;252;g39ec7bcbe7a_0_92"/>
+          <p:cNvPr id="245" name="Google Shape;245;g39ec7bcbe7a_0_92"/>
           <p:cNvSpPr txBox="1"/>
           <p:nvPr/>
         </p:nvSpPr>
@@ -21915,7 +21524,7 @@
       </p:sp>
       <p:sp>
         <p:nvSpPr>
-          <p:cNvPr id="253" name="Google Shape;253;g39ec7bcbe7a_0_92"/>
+          <p:cNvPr id="246" name="Google Shape;246;g39ec7bcbe7a_0_92"/>
           <p:cNvSpPr txBox="1"/>
           <p:nvPr/>
         </p:nvSpPr>
@@ -22013,7 +21622,7 @@
       </p:sp>
       <p:sp>
         <p:nvSpPr>
-          <p:cNvPr id="254" name="Google Shape;254;g39ec7bcbe7a_0_92"/>
+          <p:cNvPr id="247" name="Google Shape;247;g39ec7bcbe7a_0_92"/>
           <p:cNvSpPr txBox="1"/>
           <p:nvPr/>
         </p:nvSpPr>
@@ -22111,7 +21720,7 @@
       </p:sp>
       <p:sp>
         <p:nvSpPr>
-          <p:cNvPr id="255" name="Google Shape;255;g39ec7bcbe7a_0_92"/>
+          <p:cNvPr id="248" name="Google Shape;248;g39ec7bcbe7a_0_92"/>
           <p:cNvSpPr/>
           <p:nvPr/>
         </p:nvSpPr>
@@ -22165,7 +21774,7 @@
       </p:sp>
       <p:sp>
         <p:nvSpPr>
-          <p:cNvPr id="256" name="Google Shape;256;g39ec7bcbe7a_0_92"/>
+          <p:cNvPr id="249" name="Google Shape;249;g39ec7bcbe7a_0_92"/>
           <p:cNvSpPr/>
           <p:nvPr/>
         </p:nvSpPr>
@@ -22219,7 +21828,7 @@
       </p:sp>
       <p:sp>
         <p:nvSpPr>
-          <p:cNvPr id="257" name="Google Shape;257;g39ec7bcbe7a_0_92"/>
+          <p:cNvPr id="250" name="Google Shape;250;g39ec7bcbe7a_0_92"/>
           <p:cNvSpPr/>
           <p:nvPr/>
         </p:nvSpPr>
@@ -22273,7 +21882,7 @@
       </p:sp>
       <p:sp>
         <p:nvSpPr>
-          <p:cNvPr id="258" name="Google Shape;258;g39ec7bcbe7a_0_92"/>
+          <p:cNvPr id="251" name="Google Shape;251;g39ec7bcbe7a_0_92"/>
           <p:cNvSpPr txBox="1"/>
           <p:nvPr/>
         </p:nvSpPr>
@@ -22371,7 +21980,7 @@
       </p:sp>
       <p:sp>
         <p:nvSpPr>
-          <p:cNvPr id="259" name="Google Shape;259;g39ec7bcbe7a_0_92"/>
+          <p:cNvPr id="252" name="Google Shape;252;g39ec7bcbe7a_0_92"/>
           <p:cNvSpPr txBox="1"/>
           <p:nvPr/>
         </p:nvSpPr>
@@ -22469,7 +22078,7 @@
       </p:sp>
       <p:sp>
         <p:nvSpPr>
-          <p:cNvPr id="260" name="Google Shape;260;g39ec7bcbe7a_0_92"/>
+          <p:cNvPr id="253" name="Google Shape;253;g39ec7bcbe7a_0_92"/>
           <p:cNvSpPr/>
           <p:nvPr/>
         </p:nvSpPr>
@@ -22523,7 +22132,7 @@
       </p:sp>
       <p:sp>
         <p:nvSpPr>
-          <p:cNvPr id="261" name="Google Shape;261;g39ec7bcbe7a_0_92"/>
+          <p:cNvPr id="254" name="Google Shape;254;g39ec7bcbe7a_0_92"/>
           <p:cNvSpPr txBox="1"/>
           <p:nvPr/>
         </p:nvSpPr>
@@ -22621,7 +22230,7 @@
       </p:sp>
       <p:sp>
         <p:nvSpPr>
-          <p:cNvPr id="262" name="Google Shape;262;g39ec7bcbe7a_0_92"/>
+          <p:cNvPr id="255" name="Google Shape;255;g39ec7bcbe7a_0_92"/>
           <p:cNvSpPr txBox="1"/>
           <p:nvPr/>
         </p:nvSpPr>
@@ -22719,7 +22328,7 @@
       </p:sp>
       <p:sp>
         <p:nvSpPr>
-          <p:cNvPr id="263" name="Google Shape;263;g39ec7bcbe7a_0_92"/>
+          <p:cNvPr id="256" name="Google Shape;256;g39ec7bcbe7a_0_92"/>
           <p:cNvSpPr txBox="1"/>
           <p:nvPr/>
         </p:nvSpPr>
@@ -22817,7 +22426,7 @@
       </p:sp>
       <p:sp>
         <p:nvSpPr>
-          <p:cNvPr id="264" name="Google Shape;264;g39ec7bcbe7a_0_92"/>
+          <p:cNvPr id="257" name="Google Shape;257;g39ec7bcbe7a_0_92"/>
           <p:cNvSpPr/>
           <p:nvPr/>
         </p:nvSpPr>
@@ -22871,7 +22480,7 @@
       </p:sp>
       <p:sp>
         <p:nvSpPr>
-          <p:cNvPr id="265" name="Google Shape;265;g39ec7bcbe7a_0_92"/>
+          <p:cNvPr id="258" name="Google Shape;258;g39ec7bcbe7a_0_92"/>
           <p:cNvSpPr txBox="1"/>
           <p:nvPr/>
         </p:nvSpPr>
@@ -22969,7 +22578,7 @@
       </p:sp>
       <p:sp>
         <p:nvSpPr>
-          <p:cNvPr id="266" name="Google Shape;266;g39ec7bcbe7a_0_92"/>
+          <p:cNvPr id="259" name="Google Shape;259;g39ec7bcbe7a_0_92"/>
           <p:cNvSpPr txBox="1"/>
           <p:nvPr/>
         </p:nvSpPr>
@@ -23067,7 +22676,7 @@
       </p:sp>
       <p:sp>
         <p:nvSpPr>
-          <p:cNvPr id="267" name="Google Shape;267;g39ec7bcbe7a_0_92"/>
+          <p:cNvPr id="260" name="Google Shape;260;g39ec7bcbe7a_0_92"/>
           <p:cNvSpPr/>
           <p:nvPr/>
         </p:nvSpPr>
@@ -23121,7 +22730,7 @@
       </p:sp>
       <p:sp>
         <p:nvSpPr>
-          <p:cNvPr id="268" name="Google Shape;268;g39ec7bcbe7a_0_92"/>
+          <p:cNvPr id="261" name="Google Shape;261;g39ec7bcbe7a_0_92"/>
           <p:cNvSpPr txBox="1"/>
           <p:nvPr/>
         </p:nvSpPr>
@@ -23219,7 +22828,7 @@
       </p:sp>
       <p:sp>
         <p:nvSpPr>
-          <p:cNvPr id="269" name="Google Shape;269;g39ec7bcbe7a_0_92"/>
+          <p:cNvPr id="262" name="Google Shape;262;g39ec7bcbe7a_0_92"/>
           <p:cNvSpPr txBox="1"/>
           <p:nvPr/>
         </p:nvSpPr>
@@ -23317,7 +22926,7 @@
       </p:sp>
       <p:sp>
         <p:nvSpPr>
-          <p:cNvPr id="270" name="Google Shape;270;g39ec7bcbe7a_0_92"/>
+          <p:cNvPr id="263" name="Google Shape;263;g39ec7bcbe7a_0_92"/>
           <p:cNvSpPr/>
           <p:nvPr/>
         </p:nvSpPr>
@@ -23371,7 +22980,7 @@
       </p:sp>
       <p:sp>
         <p:nvSpPr>
-          <p:cNvPr id="271" name="Google Shape;271;g39ec7bcbe7a_0_92"/>
+          <p:cNvPr id="264" name="Google Shape;264;g39ec7bcbe7a_0_92"/>
           <p:cNvSpPr txBox="1"/>
           <p:nvPr/>
         </p:nvSpPr>
@@ -23469,7 +23078,7 @@
       </p:sp>
       <p:sp>
         <p:nvSpPr>
-          <p:cNvPr id="272" name="Google Shape;272;g39ec7bcbe7a_0_92"/>
+          <p:cNvPr id="265" name="Google Shape;265;g39ec7bcbe7a_0_92"/>
           <p:cNvSpPr/>
           <p:nvPr/>
         </p:nvSpPr>
@@ -23523,7 +23132,7 @@
       </p:sp>
       <p:sp>
         <p:nvSpPr>
-          <p:cNvPr id="273" name="Google Shape;273;g39ec7bcbe7a_0_92"/>
+          <p:cNvPr id="266" name="Google Shape;266;g39ec7bcbe7a_0_92"/>
           <p:cNvSpPr txBox="1"/>
           <p:nvPr/>
         </p:nvSpPr>
@@ -23621,7 +23230,7 @@
       </p:sp>
       <p:sp>
         <p:nvSpPr>
-          <p:cNvPr id="274" name="Google Shape;274;g39ec7bcbe7a_0_92"/>
+          <p:cNvPr id="267" name="Google Shape;267;g39ec7bcbe7a_0_92"/>
           <p:cNvSpPr txBox="1"/>
           <p:nvPr/>
         </p:nvSpPr>
@@ -23719,7 +23328,7 @@
       </p:sp>
       <p:sp>
         <p:nvSpPr>
-          <p:cNvPr id="275" name="Google Shape;275;g39ec7bcbe7a_0_92"/>
+          <p:cNvPr id="268" name="Google Shape;268;g39ec7bcbe7a_0_92"/>
           <p:cNvSpPr txBox="1"/>
           <p:nvPr/>
         </p:nvSpPr>
@@ -23817,7 +23426,7 @@
       </p:sp>
       <p:sp>
         <p:nvSpPr>
-          <p:cNvPr id="276" name="Google Shape;276;g39ec7bcbe7a_0_92"/>
+          <p:cNvPr id="269" name="Google Shape;269;g39ec7bcbe7a_0_92"/>
           <p:cNvSpPr txBox="1"/>
           <p:nvPr/>
         </p:nvSpPr>
@@ -23915,7 +23524,7 @@
       </p:sp>
       <p:sp>
         <p:nvSpPr>
-          <p:cNvPr id="277" name="Google Shape;277;g39ec7bcbe7a_0_92"/>
+          <p:cNvPr id="270" name="Google Shape;270;g39ec7bcbe7a_0_92"/>
           <p:cNvSpPr/>
           <p:nvPr/>
         </p:nvSpPr>
@@ -23969,7 +23578,7 @@
       </p:sp>
       <p:sp>
         <p:nvSpPr>
-          <p:cNvPr id="278" name="Google Shape;278;g39ec7bcbe7a_0_92"/>
+          <p:cNvPr id="271" name="Google Shape;271;g39ec7bcbe7a_0_92"/>
           <p:cNvSpPr txBox="1"/>
           <p:nvPr/>
         </p:nvSpPr>
@@ -24059,7 +23668,7 @@
                                           </p:stCondLst>
                                         </p:cTn>
                                         <p:tgtEl>
-                                          <p:spTgt spid="255"/>
+                                          <p:spTgt spid="248"/>
                                         </p:tgtEl>
                                         <p:attrNameLst>
                                           <p:attrName>style.visibility</p:attrName>
@@ -24074,6 +23683,240 @@
                               </p:par>
                               <p:par>
                                 <p:cTn fill="hold" nodeType="withEffect" presetClass="entr" presetID="1" presetSubtype="0">
+                                  <p:stCondLst>
+                                    <p:cond delay="0"/>
+                                  </p:stCondLst>
+                                  <p:childTnLst>
+                                    <p:set>
+                                      <p:cBhvr>
+                                        <p:cTn dur="1" fill="hold">
+                                          <p:stCondLst>
+                                            <p:cond delay="0"/>
+                                          </p:stCondLst>
+                                        </p:cTn>
+                                        <p:tgtEl>
+                                          <p:spTgt spid="244"/>
+                                        </p:tgtEl>
+                                        <p:attrNameLst>
+                                          <p:attrName>style.visibility</p:attrName>
+                                        </p:attrNameLst>
+                                      </p:cBhvr>
+                                      <p:to>
+                                        <p:strVal val="visible"/>
+                                      </p:to>
+                                    </p:set>
+                                  </p:childTnLst>
+                                </p:cTn>
+                              </p:par>
+                            </p:childTnLst>
+                          </p:cTn>
+                        </p:par>
+                      </p:childTnLst>
+                    </p:cTn>
+                  </p:par>
+                  <p:par>
+                    <p:cTn fill="hold">
+                      <p:stCondLst>
+                        <p:cond delay="indefinite"/>
+                      </p:stCondLst>
+                      <p:childTnLst>
+                        <p:par>
+                          <p:cTn fill="hold">
+                            <p:stCondLst>
+                              <p:cond delay="0"/>
+                            </p:stCondLst>
+                            <p:childTnLst>
+                              <p:par>
+                                <p:cTn fill="hold" nodeType="clickEffect" presetClass="entr" presetID="1" presetSubtype="0">
+                                  <p:stCondLst>
+                                    <p:cond delay="0"/>
+                                  </p:stCondLst>
+                                  <p:childTnLst>
+                                    <p:set>
+                                      <p:cBhvr>
+                                        <p:cTn dur="1" fill="hold">
+                                          <p:stCondLst>
+                                            <p:cond delay="0"/>
+                                          </p:stCondLst>
+                                        </p:cTn>
+                                        <p:tgtEl>
+                                          <p:spTgt spid="245"/>
+                                        </p:tgtEl>
+                                        <p:attrNameLst>
+                                          <p:attrName>style.visibility</p:attrName>
+                                        </p:attrNameLst>
+                                      </p:cBhvr>
+                                      <p:to>
+                                        <p:strVal val="visible"/>
+                                      </p:to>
+                                    </p:set>
+                                  </p:childTnLst>
+                                </p:cTn>
+                              </p:par>
+                              <p:par>
+                                <p:cTn fill="hold" nodeType="withEffect" presetClass="entr" presetID="1" presetSubtype="0">
+                                  <p:stCondLst>
+                                    <p:cond delay="0"/>
+                                  </p:stCondLst>
+                                  <p:childTnLst>
+                                    <p:set>
+                                      <p:cBhvr>
+                                        <p:cTn dur="1" fill="hold">
+                                          <p:stCondLst>
+                                            <p:cond delay="0"/>
+                                          </p:stCondLst>
+                                        </p:cTn>
+                                        <p:tgtEl>
+                                          <p:spTgt spid="249"/>
+                                        </p:tgtEl>
+                                        <p:attrNameLst>
+                                          <p:attrName>style.visibility</p:attrName>
+                                        </p:attrNameLst>
+                                      </p:cBhvr>
+                                      <p:to>
+                                        <p:strVal val="visible"/>
+                                      </p:to>
+                                    </p:set>
+                                  </p:childTnLst>
+                                </p:cTn>
+                              </p:par>
+                            </p:childTnLst>
+                          </p:cTn>
+                        </p:par>
+                      </p:childTnLst>
+                    </p:cTn>
+                  </p:par>
+                  <p:par>
+                    <p:cTn fill="hold">
+                      <p:stCondLst>
+                        <p:cond delay="indefinite"/>
+                      </p:stCondLst>
+                      <p:childTnLst>
+                        <p:par>
+                          <p:cTn fill="hold">
+                            <p:stCondLst>
+                              <p:cond delay="0"/>
+                            </p:stCondLst>
+                            <p:childTnLst>
+                              <p:par>
+                                <p:cTn fill="hold" nodeType="clickEffect" presetClass="entr" presetID="1" presetSubtype="0">
+                                  <p:stCondLst>
+                                    <p:cond delay="0"/>
+                                  </p:stCondLst>
+                                  <p:childTnLst>
+                                    <p:set>
+                                      <p:cBhvr>
+                                        <p:cTn dur="1" fill="hold">
+                                          <p:stCondLst>
+                                            <p:cond delay="0"/>
+                                          </p:stCondLst>
+                                        </p:cTn>
+                                        <p:tgtEl>
+                                          <p:spTgt spid="246"/>
+                                        </p:tgtEl>
+                                        <p:attrNameLst>
+                                          <p:attrName>style.visibility</p:attrName>
+                                        </p:attrNameLst>
+                                      </p:cBhvr>
+                                      <p:to>
+                                        <p:strVal val="visible"/>
+                                      </p:to>
+                                    </p:set>
+                                  </p:childTnLst>
+                                </p:cTn>
+                              </p:par>
+                              <p:par>
+                                <p:cTn fill="hold" nodeType="withEffect" presetClass="entr" presetID="1" presetSubtype="0">
+                                  <p:stCondLst>
+                                    <p:cond delay="0"/>
+                                  </p:stCondLst>
+                                  <p:childTnLst>
+                                    <p:set>
+                                      <p:cBhvr>
+                                        <p:cTn dur="1" fill="hold">
+                                          <p:stCondLst>
+                                            <p:cond delay="0"/>
+                                          </p:stCondLst>
+                                        </p:cTn>
+                                        <p:tgtEl>
+                                          <p:spTgt spid="250"/>
+                                        </p:tgtEl>
+                                        <p:attrNameLst>
+                                          <p:attrName>style.visibility</p:attrName>
+                                        </p:attrNameLst>
+                                      </p:cBhvr>
+                                      <p:to>
+                                        <p:strVal val="visible"/>
+                                      </p:to>
+                                    </p:set>
+                                  </p:childTnLst>
+                                </p:cTn>
+                              </p:par>
+                            </p:childTnLst>
+                          </p:cTn>
+                        </p:par>
+                      </p:childTnLst>
+                    </p:cTn>
+                  </p:par>
+                  <p:par>
+                    <p:cTn fill="hold">
+                      <p:stCondLst>
+                        <p:cond delay="indefinite"/>
+                      </p:stCondLst>
+                      <p:childTnLst>
+                        <p:par>
+                          <p:cTn fill="hold">
+                            <p:stCondLst>
+                              <p:cond delay="0"/>
+                            </p:stCondLst>
+                            <p:childTnLst>
+                              <p:par>
+                                <p:cTn fill="hold" nodeType="clickEffect" presetClass="entr" presetID="1" presetSubtype="0">
+                                  <p:stCondLst>
+                                    <p:cond delay="0"/>
+                                  </p:stCondLst>
+                                  <p:childTnLst>
+                                    <p:set>
+                                      <p:cBhvr>
+                                        <p:cTn dur="1" fill="hold">
+                                          <p:stCondLst>
+                                            <p:cond delay="0"/>
+                                          </p:stCondLst>
+                                        </p:cTn>
+                                        <p:tgtEl>
+                                          <p:spTgt spid="247"/>
+                                        </p:tgtEl>
+                                        <p:attrNameLst>
+                                          <p:attrName>style.visibility</p:attrName>
+                                        </p:attrNameLst>
+                                      </p:cBhvr>
+                                      <p:to>
+                                        <p:strVal val="visible"/>
+                                      </p:to>
+                                    </p:set>
+                                  </p:childTnLst>
+                                </p:cTn>
+                              </p:par>
+                            </p:childTnLst>
+                          </p:cTn>
+                        </p:par>
+                      </p:childTnLst>
+                    </p:cTn>
+                  </p:par>
+                  <p:par>
+                    <p:cTn fill="hold">
+                      <p:stCondLst>
+                        <p:cond delay="indefinite"/>
+                      </p:stCondLst>
+                      <p:childTnLst>
+                        <p:par>
+                          <p:cTn fill="hold">
+                            <p:stCondLst>
+                              <p:cond delay="0"/>
+                            </p:stCondLst>
+                            <p:childTnLst>
+                              <p:par>
+                                <p:cTn fill="hold" nodeType="clickEffect" presetClass="entr" presetID="1" presetSubtype="0">
                                   <p:stCondLst>
                                     <p:cond delay="0"/>
                                   </p:stCondLst>
@@ -24158,79 +24001,7 @@
                                           </p:stCondLst>
                                         </p:cTn>
                                         <p:tgtEl>
-                                          <p:spTgt spid="256"/>
-                                        </p:tgtEl>
-                                        <p:attrNameLst>
-                                          <p:attrName>style.visibility</p:attrName>
-                                        </p:attrNameLst>
-                                      </p:cBhvr>
-                                      <p:to>
-                                        <p:strVal val="visible"/>
-                                      </p:to>
-                                    </p:set>
-                                  </p:childTnLst>
-                                </p:cTn>
-                              </p:par>
-                            </p:childTnLst>
-                          </p:cTn>
-                        </p:par>
-                      </p:childTnLst>
-                    </p:cTn>
-                  </p:par>
-                  <p:par>
-                    <p:cTn fill="hold">
-                      <p:stCondLst>
-                        <p:cond delay="indefinite"/>
-                      </p:stCondLst>
-                      <p:childTnLst>
-                        <p:par>
-                          <p:cTn fill="hold">
-                            <p:stCondLst>
-                              <p:cond delay="0"/>
-                            </p:stCondLst>
-                            <p:childTnLst>
-                              <p:par>
-                                <p:cTn fill="hold" nodeType="clickEffect" presetClass="entr" presetID="1" presetSubtype="0">
-                                  <p:stCondLst>
-                                    <p:cond delay="0"/>
-                                  </p:stCondLst>
-                                  <p:childTnLst>
-                                    <p:set>
-                                      <p:cBhvr>
-                                        <p:cTn dur="1" fill="hold">
-                                          <p:stCondLst>
-                                            <p:cond delay="0"/>
-                                          </p:stCondLst>
-                                        </p:cTn>
-                                        <p:tgtEl>
                                           <p:spTgt spid="253"/>
-                                        </p:tgtEl>
-                                        <p:attrNameLst>
-                                          <p:attrName>style.visibility</p:attrName>
-                                        </p:attrNameLst>
-                                      </p:cBhvr>
-                                      <p:to>
-                                        <p:strVal val="visible"/>
-                                      </p:to>
-                                    </p:set>
-                                  </p:childTnLst>
-                                </p:cTn>
-                              </p:par>
-                              <p:par>
-                                <p:cTn fill="hold" nodeType="withEffect" presetClass="entr" presetID="1" presetSubtype="0">
-                                  <p:stCondLst>
-                                    <p:cond delay="0"/>
-                                  </p:stCondLst>
-                                  <p:childTnLst>
-                                    <p:set>
-                                      <p:cBhvr>
-                                        <p:cTn dur="1" fill="hold">
-                                          <p:stCondLst>
-                                            <p:cond delay="0"/>
-                                          </p:stCondLst>
-                                        </p:cTn>
-                                        <p:tgtEl>
-                                          <p:spTgt spid="257"/>
                                         </p:tgtEl>
                                         <p:attrNameLst>
                                           <p:attrName>style.visibility</p:attrName>
@@ -24276,6 +24047,123 @@
                                         </p:cTn>
                                         <p:tgtEl>
                                           <p:spTgt spid="254"/>
+                                        </p:tgtEl>
+                                        <p:attrNameLst>
+                                          <p:attrName>style.visibility</p:attrName>
+                                        </p:attrNameLst>
+                                      </p:cBhvr>
+                                      <p:to>
+                                        <p:strVal val="visible"/>
+                                      </p:to>
+                                    </p:set>
+                                  </p:childTnLst>
+                                </p:cTn>
+                              </p:par>
+                            </p:childTnLst>
+                          </p:cTn>
+                        </p:par>
+                      </p:childTnLst>
+                    </p:cTn>
+                  </p:par>
+                  <p:par>
+                    <p:cTn fill="hold">
+                      <p:stCondLst>
+                        <p:cond delay="indefinite"/>
+                      </p:stCondLst>
+                      <p:childTnLst>
+                        <p:par>
+                          <p:cTn fill="hold">
+                            <p:stCondLst>
+                              <p:cond delay="0"/>
+                            </p:stCondLst>
+                            <p:childTnLst>
+                              <p:par>
+                                <p:cTn fill="hold" nodeType="clickEffect" presetClass="entr" presetID="1" presetSubtype="0">
+                                  <p:stCondLst>
+                                    <p:cond delay="0"/>
+                                  </p:stCondLst>
+                                  <p:childTnLst>
+                                    <p:set>
+                                      <p:cBhvr>
+                                        <p:cTn dur="1" fill="hold">
+                                          <p:stCondLst>
+                                            <p:cond delay="0"/>
+                                          </p:stCondLst>
+                                        </p:cTn>
+                                        <p:tgtEl>
+                                          <p:spTgt spid="255"/>
+                                        </p:tgtEl>
+                                        <p:attrNameLst>
+                                          <p:attrName>style.visibility</p:attrName>
+                                        </p:attrNameLst>
+                                      </p:cBhvr>
+                                      <p:to>
+                                        <p:strVal val="visible"/>
+                                      </p:to>
+                                    </p:set>
+                                  </p:childTnLst>
+                                </p:cTn>
+                              </p:par>
+                            </p:childTnLst>
+                          </p:cTn>
+                        </p:par>
+                      </p:childTnLst>
+                    </p:cTn>
+                  </p:par>
+                  <p:par>
+                    <p:cTn fill="hold">
+                      <p:stCondLst>
+                        <p:cond delay="indefinite"/>
+                      </p:stCondLst>
+                      <p:childTnLst>
+                        <p:par>
+                          <p:cTn fill="hold">
+                            <p:stCondLst>
+                              <p:cond delay="0"/>
+                            </p:stCondLst>
+                            <p:childTnLst>
+                              <p:par>
+                                <p:cTn fill="hold" nodeType="clickEffect" presetClass="entr" presetID="1" presetSubtype="0">
+                                  <p:stCondLst>
+                                    <p:cond delay="0"/>
+                                  </p:stCondLst>
+                                  <p:childTnLst>
+                                    <p:set>
+                                      <p:cBhvr>
+                                        <p:cTn dur="1" fill="hold">
+                                          <p:stCondLst>
+                                            <p:cond delay="0"/>
+                                          </p:stCondLst>
+                                        </p:cTn>
+                                        <p:tgtEl>
+                                          <p:spTgt spid="256"/>
+                                        </p:tgtEl>
+                                        <p:attrNameLst>
+                                          <p:attrName>style.visibility</p:attrName>
+                                        </p:attrNameLst>
+                                      </p:cBhvr>
+                                      <p:to>
+                                        <p:strVal val="visible"/>
+                                      </p:to>
+                                    </p:set>
+                                  </p:childTnLst>
+                                </p:cTn>
+                              </p:par>
+                              <p:par>
+                                <p:cTn fill="hold" nodeType="withEffect" presetClass="entr" presetID="1" presetSubtype="0">
+                                  <p:stCondLst>
+                                    <p:cond delay="0"/>
+                                  </p:stCondLst>
+                                  <p:childTnLst>
+                                    <p:set>
+                                      <p:cBhvr>
+                                        <p:cTn dur="1" fill="hold">
+                                          <p:stCondLst>
+                                            <p:cond delay="0"/>
+                                          </p:stCondLst>
+                                        </p:cTn>
+                                        <p:tgtEl>
+                                          <p:spTgt spid="257"/>
                                         </p:tgtEl>
                                         <p:attrNameLst>
                                           <p:attrName>style.visibility</p:attrName>
@@ -24495,6 +24383,33 @@
                                   </p:childTnLst>
                                 </p:cTn>
                               </p:par>
+                              <p:par>
+                                <p:cTn fill="hold" nodeType="withEffect" presetClass="entr" presetID="1" presetSubtype="0">
+                                  <p:stCondLst>
+                                    <p:cond delay="0"/>
+                                  </p:stCondLst>
+                                  <p:childTnLst>
+                                    <p:set>
+                                      <p:cBhvr>
+                                        <p:cTn dur="1" fill="hold">
+                                          <p:stCondLst>
+                                            <p:cond delay="0"/>
+                                          </p:stCondLst>
+                                        </p:cTn>
+                                        <p:tgtEl>
+                                          <p:spTgt spid="263"/>
+                                        </p:tgtEl>
+                                        <p:attrNameLst>
+                                          <p:attrName>style.visibility</p:attrName>
+                                        </p:attrNameLst>
+                                      </p:cBhvr>
+                                      <p:to>
+                                        <p:strVal val="visible"/>
+                                      </p:to>
+                                    </p:set>
+                                  </p:childTnLst>
+                                </p:cTn>
+                              </p:par>
                             </p:childTnLst>
                           </p:cTn>
                         </p:par>
@@ -24527,7 +24442,7 @@
                                           </p:stCondLst>
                                         </p:cTn>
                                         <p:tgtEl>
-                                          <p:spTgt spid="263"/>
+                                          <p:spTgt spid="264"/>
                                         </p:tgtEl>
                                         <p:attrNameLst>
                                           <p:attrName>style.visibility</p:attrName>
@@ -24542,51 +24457,6 @@
                               </p:par>
                               <p:par>
                                 <p:cTn fill="hold" nodeType="withEffect" presetClass="entr" presetID="1" presetSubtype="0">
-                                  <p:stCondLst>
-                                    <p:cond delay="0"/>
-                                  </p:stCondLst>
-                                  <p:childTnLst>
-                                    <p:set>
-                                      <p:cBhvr>
-                                        <p:cTn dur="1" fill="hold">
-                                          <p:stCondLst>
-                                            <p:cond delay="0"/>
-                                          </p:stCondLst>
-                                        </p:cTn>
-                                        <p:tgtEl>
-                                          <p:spTgt spid="264"/>
-                                        </p:tgtEl>
-                                        <p:attrNameLst>
-                                          <p:attrName>style.visibility</p:attrName>
-                                        </p:attrNameLst>
-                                      </p:cBhvr>
-                                      <p:to>
-                                        <p:strVal val="visible"/>
-                                      </p:to>
-                                    </p:set>
-                                  </p:childTnLst>
-                                </p:cTn>
-                              </p:par>
-                            </p:childTnLst>
-                          </p:cTn>
-                        </p:par>
-                      </p:childTnLst>
-                    </p:cTn>
-                  </p:par>
-                  <p:par>
-                    <p:cTn fill="hold">
-                      <p:stCondLst>
-                        <p:cond delay="indefinite"/>
-                      </p:stCondLst>
-                      <p:childTnLst>
-                        <p:par>
-                          <p:cTn fill="hold">
-                            <p:stCondLst>
-                              <p:cond delay="0"/>
-                            </p:stCondLst>
-                            <p:childTnLst>
-                              <p:par>
-                                <p:cTn fill="hold" nodeType="clickEffect" presetClass="entr" presetID="1" presetSubtype="0">
                                   <p:stCondLst>
                                     <p:cond delay="0"/>
                                   </p:stCondLst>
@@ -24657,8 +24527,26 @@
                                   </p:childTnLst>
                                 </p:cTn>
                               </p:par>
+                            </p:childTnLst>
+                          </p:cTn>
+                        </p:par>
+                      </p:childTnLst>
+                    </p:cTn>
+                  </p:par>
+                  <p:par>
+                    <p:cTn fill="hold">
+                      <p:stCondLst>
+                        <p:cond delay="indefinite"/>
+                      </p:stCondLst>
+                      <p:childTnLst>
+                        <p:par>
+                          <p:cTn fill="hold">
+                            <p:stCondLst>
+                              <p:cond delay="0"/>
+                            </p:stCondLst>
+                            <p:childTnLst>
                               <p:par>
-                                <p:cTn fill="hold" nodeType="withEffect" presetClass="entr" presetID="1" presetSubtype="0">
+                                <p:cTn fill="hold" nodeType="clickEffect" presetClass="entr" presetID="1" presetSubtype="0">
                                   <p:stCondLst>
                                     <p:cond delay="0"/>
                                   </p:stCondLst>
@@ -24801,51 +24689,6 @@
                                   </p:childTnLst>
                                 </p:cTn>
                               </p:par>
-                            </p:childTnLst>
-                          </p:cTn>
-                        </p:par>
-                      </p:childTnLst>
-                    </p:cTn>
-                  </p:par>
-                  <p:par>
-                    <p:cTn fill="hold">
-                      <p:stCondLst>
-                        <p:cond delay="indefinite"/>
-                      </p:stCondLst>
-                      <p:childTnLst>
-                        <p:par>
-                          <p:cTn fill="hold">
-                            <p:stCondLst>
-                              <p:cond delay="0"/>
-                            </p:stCondLst>
-                            <p:childTnLst>
-                              <p:par>
-                                <p:cTn fill="hold" nodeType="clickEffect" presetClass="entr" presetID="1" presetSubtype="0">
-                                  <p:stCondLst>
-                                    <p:cond delay="0"/>
-                                  </p:stCondLst>
-                                  <p:childTnLst>
-                                    <p:set>
-                                      <p:cBhvr>
-                                        <p:cTn dur="1" fill="hold">
-                                          <p:stCondLst>
-                                            <p:cond delay="0"/>
-                                          </p:stCondLst>
-                                        </p:cTn>
-                                        <p:tgtEl>
-                                          <p:spTgt spid="271"/>
-                                        </p:tgtEl>
-                                        <p:attrNameLst>
-                                          <p:attrName>style.visibility</p:attrName>
-                                        </p:attrNameLst>
-                                      </p:cBhvr>
-                                      <p:to>
-                                        <p:strVal val="visible"/>
-                                      </p:to>
-                                    </p:set>
-                                  </p:childTnLst>
-                                </p:cTn>
-                              </p:par>
                               <p:par>
                                 <p:cTn fill="hold" nodeType="withEffect" presetClass="entr" presetID="1" presetSubtype="0">
                                   <p:stCondLst>
@@ -24860,241 +24703,7 @@
                                           </p:stCondLst>
                                         </p:cTn>
                                         <p:tgtEl>
-                                          <p:spTgt spid="272"/>
-                                        </p:tgtEl>
-                                        <p:attrNameLst>
-                                          <p:attrName>style.visibility</p:attrName>
-                                        </p:attrNameLst>
-                                      </p:cBhvr>
-                                      <p:to>
-                                        <p:strVal val="visible"/>
-                                      </p:to>
-                                    </p:set>
-                                  </p:childTnLst>
-                                </p:cTn>
-                              </p:par>
-                            </p:childTnLst>
-                          </p:cTn>
-                        </p:par>
-                      </p:childTnLst>
-                    </p:cTn>
-                  </p:par>
-                  <p:par>
-                    <p:cTn fill="hold">
-                      <p:stCondLst>
-                        <p:cond delay="indefinite"/>
-                      </p:stCondLst>
-                      <p:childTnLst>
-                        <p:par>
-                          <p:cTn fill="hold">
-                            <p:stCondLst>
-                              <p:cond delay="0"/>
-                            </p:stCondLst>
-                            <p:childTnLst>
-                              <p:par>
-                                <p:cTn fill="hold" nodeType="clickEffect" presetClass="entr" presetID="1" presetSubtype="0">
-                                  <p:stCondLst>
-                                    <p:cond delay="0"/>
-                                  </p:stCondLst>
-                                  <p:childTnLst>
-                                    <p:set>
-                                      <p:cBhvr>
-                                        <p:cTn dur="1" fill="hold">
-                                          <p:stCondLst>
-                                            <p:cond delay="0"/>
-                                          </p:stCondLst>
-                                        </p:cTn>
-                                        <p:tgtEl>
-                                          <p:spTgt spid="273"/>
-                                        </p:tgtEl>
-                                        <p:attrNameLst>
-                                          <p:attrName>style.visibility</p:attrName>
-                                        </p:attrNameLst>
-                                      </p:cBhvr>
-                                      <p:to>
-                                        <p:strVal val="visible"/>
-                                      </p:to>
-                                    </p:set>
-                                  </p:childTnLst>
-                                </p:cTn>
-                              </p:par>
-                            </p:childTnLst>
-                          </p:cTn>
-                        </p:par>
-                      </p:childTnLst>
-                    </p:cTn>
-                  </p:par>
-                  <p:par>
-                    <p:cTn fill="hold">
-                      <p:stCondLst>
-                        <p:cond delay="indefinite"/>
-                      </p:stCondLst>
-                      <p:childTnLst>
-                        <p:par>
-                          <p:cTn fill="hold">
-                            <p:stCondLst>
-                              <p:cond delay="0"/>
-                            </p:stCondLst>
-                            <p:childTnLst>
-                              <p:par>
-                                <p:cTn fill="hold" nodeType="clickEffect" presetClass="entr" presetID="1" presetSubtype="0">
-                                  <p:stCondLst>
-                                    <p:cond delay="0"/>
-                                  </p:stCondLst>
-                                  <p:childTnLst>
-                                    <p:set>
-                                      <p:cBhvr>
-                                        <p:cTn dur="1" fill="hold">
-                                          <p:stCondLst>
-                                            <p:cond delay="0"/>
-                                          </p:stCondLst>
-                                        </p:cTn>
-                                        <p:tgtEl>
-                                          <p:spTgt spid="274"/>
-                                        </p:tgtEl>
-                                        <p:attrNameLst>
-                                          <p:attrName>style.visibility</p:attrName>
-                                        </p:attrNameLst>
-                                      </p:cBhvr>
-                                      <p:to>
-                                        <p:strVal val="visible"/>
-                                      </p:to>
-                                    </p:set>
-                                  </p:childTnLst>
-                                </p:cTn>
-                              </p:par>
-                            </p:childTnLst>
-                          </p:cTn>
-                        </p:par>
-                      </p:childTnLst>
-                    </p:cTn>
-                  </p:par>
-                  <p:par>
-                    <p:cTn fill="hold">
-                      <p:stCondLst>
-                        <p:cond delay="indefinite"/>
-                      </p:stCondLst>
-                      <p:childTnLst>
-                        <p:par>
-                          <p:cTn fill="hold">
-                            <p:stCondLst>
-                              <p:cond delay="0"/>
-                            </p:stCondLst>
-                            <p:childTnLst>
-                              <p:par>
-                                <p:cTn fill="hold" nodeType="clickEffect" presetClass="entr" presetID="1" presetSubtype="0">
-                                  <p:stCondLst>
-                                    <p:cond delay="0"/>
-                                  </p:stCondLst>
-                                  <p:childTnLst>
-                                    <p:set>
-                                      <p:cBhvr>
-                                        <p:cTn dur="1" fill="hold">
-                                          <p:stCondLst>
-                                            <p:cond delay="0"/>
-                                          </p:stCondLst>
-                                        </p:cTn>
-                                        <p:tgtEl>
-                                          <p:spTgt spid="275"/>
-                                        </p:tgtEl>
-                                        <p:attrNameLst>
-                                          <p:attrName>style.visibility</p:attrName>
-                                        </p:attrNameLst>
-                                      </p:cBhvr>
-                                      <p:to>
-                                        <p:strVal val="visible"/>
-                                      </p:to>
-                                    </p:set>
-                                  </p:childTnLst>
-                                </p:cTn>
-                              </p:par>
-                            </p:childTnLst>
-                          </p:cTn>
-                        </p:par>
-                      </p:childTnLst>
-                    </p:cTn>
-                  </p:par>
-                  <p:par>
-                    <p:cTn fill="hold">
-                      <p:stCondLst>
-                        <p:cond delay="indefinite"/>
-                      </p:stCondLst>
-                      <p:childTnLst>
-                        <p:par>
-                          <p:cTn fill="hold">
-                            <p:stCondLst>
-                              <p:cond delay="0"/>
-                            </p:stCondLst>
-                            <p:childTnLst>
-                              <p:par>
-                                <p:cTn fill="hold" nodeType="clickEffect" presetClass="entr" presetID="1" presetSubtype="0">
-                                  <p:stCondLst>
-                                    <p:cond delay="0"/>
-                                  </p:stCondLst>
-                                  <p:childTnLst>
-                                    <p:set>
-                                      <p:cBhvr>
-                                        <p:cTn dur="1" fill="hold">
-                                          <p:stCondLst>
-                                            <p:cond delay="0"/>
-                                          </p:stCondLst>
-                                        </p:cTn>
-                                        <p:tgtEl>
-                                          <p:spTgt spid="276"/>
-                                        </p:tgtEl>
-                                        <p:attrNameLst>
-                                          <p:attrName>style.visibility</p:attrName>
-                                        </p:attrNameLst>
-                                      </p:cBhvr>
-                                      <p:to>
-                                        <p:strVal val="visible"/>
-                                      </p:to>
-                                    </p:set>
-                                  </p:childTnLst>
-                                </p:cTn>
-                              </p:par>
-                              <p:par>
-                                <p:cTn fill="hold" nodeType="withEffect" presetClass="entr" presetID="1" presetSubtype="0">
-                                  <p:stCondLst>
-                                    <p:cond delay="0"/>
-                                  </p:stCondLst>
-                                  <p:childTnLst>
-                                    <p:set>
-                                      <p:cBhvr>
-                                        <p:cTn dur="1" fill="hold">
-                                          <p:stCondLst>
-                                            <p:cond delay="0"/>
-                                          </p:stCondLst>
-                                        </p:cTn>
-                                        <p:tgtEl>
-                                          <p:spTgt spid="277"/>
-                                        </p:tgtEl>
-                                        <p:attrNameLst>
-                                          <p:attrName>style.visibility</p:attrName>
-                                        </p:attrNameLst>
-                                      </p:cBhvr>
-                                      <p:to>
-                                        <p:strVal val="visible"/>
-                                      </p:to>
-                                    </p:set>
-                                  </p:childTnLst>
-                                </p:cTn>
-                              </p:par>
-                              <p:par>
-                                <p:cTn fill="hold" nodeType="withEffect" presetClass="entr" presetID="1" presetSubtype="0">
-                                  <p:stCondLst>
-                                    <p:cond delay="0"/>
-                                  </p:stCondLst>
-                                  <p:childTnLst>
-                                    <p:set>
-                                      <p:cBhvr>
-                                        <p:cTn dur="1" fill="hold">
-                                          <p:stCondLst>
-                                            <p:cond delay="0"/>
-                                          </p:stCondLst>
-                                        </p:cTn>
-                                        <p:tgtEl>
-                                          <p:spTgt spid="278"/>
+                                          <p:spTgt spid="271"/>
                                         </p:tgtEl>
                                         <p:attrNameLst>
                                           <p:attrName>style.visibility</p:attrName>
@@ -25138,12 +24747,12 @@
 </p:sld>
 </file>
 
-<file path=ppt/slides/slide19.xml><?xml version="1.0" encoding="utf-8"?>
+<file path=ppt/slides/slide18.xml><?xml version="1.0" encoding="utf-8"?>
 <p:sld xmlns:a="http://schemas.openxmlformats.org/drawingml/2006/main" xmlns:r="http://schemas.openxmlformats.org/officeDocument/2006/relationships" xmlns:mc="http://schemas.openxmlformats.org/markup-compatibility/2006" xmlns:mv="urn:schemas-microsoft-com:mac:vml" xmlns:p="http://schemas.openxmlformats.org/presentationml/2006/main" xmlns:c="http://schemas.openxmlformats.org/drawingml/2006/chart" xmlns:dgm="http://schemas.openxmlformats.org/drawingml/2006/diagram" xmlns:o="urn:schemas-microsoft-com:office:office" xmlns:v="urn:schemas-microsoft-com:vml" xmlns:pvml="urn:schemas-microsoft-com:office:powerpoint" xmlns:com="http://schemas.openxmlformats.org/drawingml/2006/compatibility" xmlns:p14="http://schemas.microsoft.com/office/powerpoint/2010/main" xmlns:p15="http://schemas.microsoft.com/office/powerpoint/2012/main" xmlns:ahyp="http://schemas.microsoft.com/office/drawing/2018/hyperlinkcolor">
   <p:cSld>
     <p:spTree>
       <p:nvGrpSpPr>
-        <p:cNvPr id="282" name="Shape 282"/>
+        <p:cNvPr id="275" name="Shape 275"/>
         <p:cNvGrpSpPr/>
         <p:nvPr/>
       </p:nvGrpSpPr>
@@ -25157,7 +24766,7 @@
       </p:grpSpPr>
       <p:sp>
         <p:nvSpPr>
-          <p:cNvPr id="283" name="Google Shape;283;g39ec7bcbe7a_0_169"/>
+          <p:cNvPr id="276" name="Google Shape;276;g39ec7bcbe7a_0_169"/>
           <p:cNvSpPr txBox="1"/>
           <p:nvPr/>
         </p:nvSpPr>
@@ -25219,7 +24828,7 @@
       </p:sp>
       <p:sp>
         <p:nvSpPr>
-          <p:cNvPr id="284" name="Google Shape;284;g39ec7bcbe7a_0_169"/>
+          <p:cNvPr id="277" name="Google Shape;277;g39ec7bcbe7a_0_169"/>
           <p:cNvSpPr txBox="1"/>
           <p:nvPr/>
         </p:nvSpPr>
@@ -25285,7 +24894,7 @@
       </p:sp>
       <p:sp>
         <p:nvSpPr>
-          <p:cNvPr id="285" name="Google Shape;285;g39ec7bcbe7a_0_169"/>
+          <p:cNvPr id="278" name="Google Shape;278;g39ec7bcbe7a_0_169"/>
           <p:cNvSpPr txBox="1"/>
           <p:nvPr/>
         </p:nvSpPr>
@@ -25409,6 +25018,398 @@
                 </a:solidFill>
               </a:rPr>
               <a:t>PA8: Predictive algorithms </a:t>
+            </a:r>
+            <a:endParaRPr sz="2300">
+              <a:solidFill>
+                <a:schemeClr val="dk1"/>
+              </a:solidFill>
+            </a:endParaRPr>
+          </a:p>
+        </p:txBody>
+      </p:sp>
+    </p:spTree>
+  </p:cSld>
+  <p:clrMapOvr>
+    <a:masterClrMapping/>
+  </p:clrMapOvr>
+</p:sld>
+</file>
+
+<file path=ppt/slides/slide19.xml><?xml version="1.0" encoding="utf-8"?>
+<p:sld xmlns:a="http://schemas.openxmlformats.org/drawingml/2006/main" xmlns:r="http://schemas.openxmlformats.org/officeDocument/2006/relationships" xmlns:mc="http://schemas.openxmlformats.org/markup-compatibility/2006" xmlns:mv="urn:schemas-microsoft-com:mac:vml" xmlns:p="http://schemas.openxmlformats.org/presentationml/2006/main" xmlns:c="http://schemas.openxmlformats.org/drawingml/2006/chart" xmlns:dgm="http://schemas.openxmlformats.org/drawingml/2006/diagram" xmlns:o="urn:schemas-microsoft-com:office:office" xmlns:v="urn:schemas-microsoft-com:vml" xmlns:pvml="urn:schemas-microsoft-com:office:powerpoint" xmlns:com="http://schemas.openxmlformats.org/drawingml/2006/compatibility" xmlns:p14="http://schemas.microsoft.com/office/powerpoint/2010/main" xmlns:p15="http://schemas.microsoft.com/office/powerpoint/2012/main" xmlns:ahyp="http://schemas.microsoft.com/office/drawing/2018/hyperlinkcolor">
+  <p:cSld>
+    <p:spTree>
+      <p:nvGrpSpPr>
+        <p:cNvPr id="282" name="Shape 282"/>
+        <p:cNvGrpSpPr/>
+        <p:nvPr/>
+      </p:nvGrpSpPr>
+      <p:grpSpPr>
+        <a:xfrm>
+          <a:off x="0" y="0"/>
+          <a:ext cx="0" cy="0"/>
+          <a:chOff x="0" y="0"/>
+          <a:chExt cx="0" cy="0"/>
+        </a:xfrm>
+      </p:grpSpPr>
+      <p:sp>
+        <p:nvSpPr>
+          <p:cNvPr id="283" name="Google Shape;283;g394de495115_0_0"/>
+          <p:cNvSpPr txBox="1"/>
+          <p:nvPr/>
+        </p:nvSpPr>
+        <p:spPr>
+          <a:xfrm>
+            <a:off x="457200" y="228600"/>
+            <a:ext cx="8686800" cy="708000"/>
+          </a:xfrm>
+          <a:prstGeom prst="rect">
+            <a:avLst/>
+          </a:prstGeom>
+          <a:noFill/>
+          <a:ln>
+            <a:noFill/>
+          </a:ln>
+        </p:spPr>
+        <p:txBody>
+          <a:bodyPr anchorCtr="0" anchor="t" bIns="45700" lIns="91425" spcFirstLastPara="1" rIns="91425" wrap="square" tIns="45700">
+            <a:spAutoFit/>
+          </a:bodyPr>
+          <a:lstStyle/>
+          <a:p>
+            <a:pPr indent="0" lvl="0" marL="0" marR="0" rtl="0" algn="l">
+              <a:lnSpc>
+                <a:spcPct val="100000"/>
+              </a:lnSpc>
+              <a:spcBef>
+                <a:spcPts val="0"/>
+              </a:spcBef>
+              <a:spcAft>
+                <a:spcPts val="0"/>
+              </a:spcAft>
+              <a:buClr>
+                <a:schemeClr val="dk1"/>
+              </a:buClr>
+              <a:buSzPts val="4000"/>
+              <a:buFont typeface="Arial"/>
+              <a:buNone/>
+            </a:pPr>
+            <a:r>
+              <a:rPr b="0" i="0" lang="en-US" sz="4000" u="none" cap="none" strike="noStrike">
+                <a:solidFill>
+                  <a:schemeClr val="dk1"/>
+                </a:solidFill>
+                <a:latin typeface="Arial"/>
+                <a:ea typeface="Arial"/>
+                <a:cs typeface="Arial"/>
+                <a:sym typeface="Arial"/>
+              </a:rPr>
+              <a:t>PA</a:t>
+            </a:r>
+            <a:r>
+              <a:rPr lang="en-US" sz="4000">
+                <a:solidFill>
+                  <a:schemeClr val="dk1"/>
+                </a:solidFill>
+              </a:rPr>
+              <a:t>7</a:t>
+            </a:r>
+            <a:r>
+              <a:rPr b="0" i="0" lang="en-US" sz="4000" u="none" cap="none" strike="noStrike">
+                <a:solidFill>
+                  <a:schemeClr val="dk1"/>
+                </a:solidFill>
+                <a:latin typeface="Arial"/>
+                <a:ea typeface="Arial"/>
+                <a:cs typeface="Arial"/>
+                <a:sym typeface="Arial"/>
+              </a:rPr>
+              <a:t> Diagram</a:t>
+            </a:r>
+            <a:endParaRPr b="0" i="0" sz="4000" u="none" cap="none" strike="noStrike">
+              <a:solidFill>
+                <a:schemeClr val="dk1"/>
+              </a:solidFill>
+              <a:latin typeface="Arial"/>
+              <a:ea typeface="Arial"/>
+              <a:cs typeface="Arial"/>
+              <a:sym typeface="Arial"/>
+            </a:endParaRPr>
+          </a:p>
+        </p:txBody>
+      </p:sp>
+      <p:sp>
+        <p:nvSpPr>
+          <p:cNvPr id="284" name="Google Shape;284;g394de495115_0_0"/>
+          <p:cNvSpPr txBox="1"/>
+          <p:nvPr/>
+        </p:nvSpPr>
+        <p:spPr>
+          <a:xfrm>
+            <a:off x="5808000" y="6389100"/>
+            <a:ext cx="3336000" cy="468900"/>
+          </a:xfrm>
+          <a:prstGeom prst="rect">
+            <a:avLst/>
+          </a:prstGeom>
+          <a:noFill/>
+          <a:ln>
+            <a:noFill/>
+          </a:ln>
+        </p:spPr>
+        <p:txBody>
+          <a:bodyPr anchorCtr="0" anchor="t" bIns="91425" lIns="91425" spcFirstLastPara="1" rIns="91425" wrap="square" tIns="91425">
+            <a:noAutofit/>
+          </a:bodyPr>
+          <a:lstStyle/>
+          <a:p>
+            <a:pPr indent="0" lvl="0" marL="0" marR="0" rtl="0" algn="l">
+              <a:lnSpc>
+                <a:spcPct val="100000"/>
+              </a:lnSpc>
+              <a:spcBef>
+                <a:spcPts val="0"/>
+              </a:spcBef>
+              <a:spcAft>
+                <a:spcPts val="0"/>
+              </a:spcAft>
+              <a:buClr>
+                <a:srgbClr val="000000"/>
+              </a:buClr>
+              <a:buSzPts val="1800"/>
+              <a:buFont typeface="Arial"/>
+              <a:buNone/>
+            </a:pPr>
+            <a:r>
+              <a:rPr b="1" i="0" lang="en-US" sz="1800" u="none" cap="none" strike="noStrike">
+                <a:solidFill>
+                  <a:schemeClr val="lt1"/>
+                </a:solidFill>
+                <a:latin typeface="Arial"/>
+                <a:ea typeface="Arial"/>
+                <a:cs typeface="Arial"/>
+                <a:sym typeface="Arial"/>
+              </a:rPr>
+              <a:t>https://tinyurl.com/CSCI3753</a:t>
+            </a:r>
+            <a:endParaRPr b="0" i="0" sz="2300" u="none" cap="none" strike="noStrike">
+              <a:solidFill>
+                <a:schemeClr val="lt1"/>
+              </a:solidFill>
+              <a:latin typeface="Arial Black"/>
+              <a:ea typeface="Arial Black"/>
+              <a:cs typeface="Arial Black"/>
+              <a:sym typeface="Arial Black"/>
+            </a:endParaRPr>
+          </a:p>
+        </p:txBody>
+      </p:sp>
+      <p:pic>
+        <p:nvPicPr>
+          <p:cNvPr id="285" name="Google Shape;285;g394de495115_0_0" title="Screenshot 2025-10-30 at 9.23.27 PM.png"/>
+          <p:cNvPicPr preferRelativeResize="0"/>
+          <p:nvPr/>
+        </p:nvPicPr>
+        <p:blipFill>
+          <a:blip r:embed="rId3">
+            <a:alphaModFix/>
+          </a:blip>
+          <a:stretch>
+            <a:fillRect/>
+          </a:stretch>
+        </p:blipFill>
+        <p:spPr>
+          <a:xfrm>
+            <a:off x="515998" y="1111025"/>
+            <a:ext cx="5450576" cy="4175700"/>
+          </a:xfrm>
+          <a:prstGeom prst="rect">
+            <a:avLst/>
+          </a:prstGeom>
+          <a:noFill/>
+          <a:ln>
+            <a:noFill/>
+          </a:ln>
+        </p:spPr>
+      </p:pic>
+      <p:sp>
+        <p:nvSpPr>
+          <p:cNvPr id="286" name="Google Shape;286;g394de495115_0_0"/>
+          <p:cNvSpPr/>
+          <p:nvPr/>
+        </p:nvSpPr>
+        <p:spPr>
+          <a:xfrm>
+            <a:off x="4566325" y="2711950"/>
+            <a:ext cx="1564800" cy="943500"/>
+          </a:xfrm>
+          <a:prstGeom prst="ellipse">
+            <a:avLst/>
+          </a:prstGeom>
+          <a:noFill/>
+          <a:ln cap="flat" cmpd="sng" w="28575">
+            <a:solidFill>
+              <a:schemeClr val="dk2"/>
+            </a:solidFill>
+            <a:prstDash val="solid"/>
+            <a:round/>
+            <a:headEnd len="sm" w="sm" type="none"/>
+            <a:tailEnd len="sm" w="sm" type="none"/>
+          </a:ln>
+        </p:spPr>
+        <p:txBody>
+          <a:bodyPr anchorCtr="0" anchor="ctr" bIns="91425" lIns="91425" spcFirstLastPara="1" rIns="91425" wrap="square" tIns="91425">
+            <a:noAutofit/>
+          </a:bodyPr>
+          <a:lstStyle/>
+          <a:p>
+            <a:pPr indent="0" lvl="0" marL="0" rtl="0" algn="ctr">
+              <a:spcBef>
+                <a:spcPts val="0"/>
+              </a:spcBef>
+              <a:spcAft>
+                <a:spcPts val="0"/>
+              </a:spcAft>
+              <a:buNone/>
+            </a:pPr>
+            <a:r>
+              <a:t/>
+            </a:r>
+            <a:endParaRPr>
+              <a:latin typeface="Arial Black"/>
+              <a:ea typeface="Arial Black"/>
+              <a:cs typeface="Arial Black"/>
+              <a:sym typeface="Arial Black"/>
+            </a:endParaRPr>
+          </a:p>
+        </p:txBody>
+      </p:sp>
+      <p:sp>
+        <p:nvSpPr>
+          <p:cNvPr id="287" name="Google Shape;287;g394de495115_0_0"/>
+          <p:cNvSpPr txBox="1"/>
+          <p:nvPr/>
+        </p:nvSpPr>
+        <p:spPr>
+          <a:xfrm>
+            <a:off x="6004925" y="1016650"/>
+            <a:ext cx="1741500" cy="744000"/>
+          </a:xfrm>
+          <a:prstGeom prst="rect">
+            <a:avLst/>
+          </a:prstGeom>
+          <a:noFill/>
+          <a:ln cap="flat" cmpd="sng" w="28575">
+            <a:solidFill>
+              <a:schemeClr val="dk2"/>
+            </a:solidFill>
+            <a:prstDash val="solid"/>
+            <a:round/>
+            <a:headEnd len="sm" w="sm" type="none"/>
+            <a:tailEnd len="sm" w="sm" type="none"/>
+          </a:ln>
+        </p:spPr>
+        <p:txBody>
+          <a:bodyPr anchorCtr="0" anchor="t" bIns="91425" lIns="91425" spcFirstLastPara="1" rIns="91425" wrap="square" tIns="91425">
+            <a:noAutofit/>
+          </a:bodyPr>
+          <a:lstStyle/>
+          <a:p>
+            <a:pPr indent="0" lvl="0" marL="0" rtl="0" algn="l">
+              <a:spcBef>
+                <a:spcPts val="0"/>
+              </a:spcBef>
+              <a:spcAft>
+                <a:spcPts val="0"/>
+              </a:spcAft>
+              <a:buNone/>
+            </a:pPr>
+            <a:r>
+              <a:rPr lang="en-US" sz="2100">
+                <a:solidFill>
+                  <a:schemeClr val="dk2"/>
+                </a:solidFill>
+              </a:rPr>
+              <a:t>Most of y’alls work is here!</a:t>
+            </a:r>
+            <a:endParaRPr sz="2100">
+              <a:solidFill>
+                <a:schemeClr val="dk2"/>
+              </a:solidFill>
+            </a:endParaRPr>
+          </a:p>
+        </p:txBody>
+      </p:sp>
+      <p:cxnSp>
+        <p:nvCxnSpPr>
+          <p:cNvPr id="288" name="Google Shape;288;g394de495115_0_0"/>
+          <p:cNvCxnSpPr>
+            <a:stCxn id="287" idx="2"/>
+            <a:endCxn id="286" idx="0"/>
+          </p:cNvCxnSpPr>
+          <p:nvPr/>
+        </p:nvCxnSpPr>
+        <p:spPr>
+          <a:xfrm flipH="1">
+            <a:off x="5348675" y="1760650"/>
+            <a:ext cx="1527000" cy="951300"/>
+          </a:xfrm>
+          <a:prstGeom prst="straightConnector1">
+            <a:avLst/>
+          </a:prstGeom>
+          <a:noFill/>
+          <a:ln cap="flat" cmpd="sng" w="28575">
+            <a:solidFill>
+              <a:schemeClr val="dk2"/>
+            </a:solidFill>
+            <a:prstDash val="solid"/>
+            <a:round/>
+            <a:headEnd len="med" w="med" type="none"/>
+            <a:tailEnd len="med" w="med" type="triangle"/>
+          </a:ln>
+        </p:spPr>
+      </p:cxnSp>
+      <p:sp>
+        <p:nvSpPr>
+          <p:cNvPr id="289" name="Google Shape;289;g394de495115_0_0"/>
+          <p:cNvSpPr txBox="1"/>
+          <p:nvPr/>
+        </p:nvSpPr>
+        <p:spPr>
+          <a:xfrm>
+            <a:off x="111150" y="5174400"/>
+            <a:ext cx="8921700" cy="805500"/>
+          </a:xfrm>
+          <a:prstGeom prst="rect">
+            <a:avLst/>
+          </a:prstGeom>
+          <a:noFill/>
+          <a:ln>
+            <a:noFill/>
+          </a:ln>
+        </p:spPr>
+        <p:txBody>
+          <a:bodyPr anchorCtr="0" anchor="t" bIns="91425" lIns="91425" spcFirstLastPara="1" rIns="91425" wrap="square" tIns="91425">
+            <a:noAutofit/>
+          </a:bodyPr>
+          <a:lstStyle/>
+          <a:p>
+            <a:pPr indent="0" lvl="0" marL="0" rtl="0" algn="ctr">
+              <a:spcBef>
+                <a:spcPts val="0"/>
+              </a:spcBef>
+              <a:spcAft>
+                <a:spcPts val="0"/>
+              </a:spcAft>
+              <a:buNone/>
+            </a:pPr>
+            <a:r>
+              <a:rPr lang="en-US" sz="2300">
+                <a:solidFill>
+                  <a:schemeClr val="dk1"/>
+                </a:solidFill>
+              </a:rPr>
+              <a:t>Basic swapping algorithm for single process already provided in pager-basic.c!! </a:t>
             </a:r>
             <a:endParaRPr sz="2300">
               <a:solidFill>
@@ -25612,7 +25613,7 @@
   <p:cSld>
     <p:spTree>
       <p:nvGrpSpPr>
-        <p:cNvPr id="289" name="Shape 289"/>
+        <p:cNvPr id="293" name="Shape 293"/>
         <p:cNvGrpSpPr/>
         <p:nvPr/>
       </p:nvGrpSpPr>
@@ -25626,7 +25627,7 @@
       </p:grpSpPr>
       <p:sp>
         <p:nvSpPr>
-          <p:cNvPr id="290" name="Google Shape;290;g394de495115_0_0"/>
+          <p:cNvPr id="294" name="Google Shape;294;g39ec7bcbe7a_0_175"/>
           <p:cNvSpPr txBox="1"/>
           <p:nvPr/>
         </p:nvSpPr>
@@ -25712,7 +25713,7 @@
       </p:sp>
       <p:sp>
         <p:nvSpPr>
-          <p:cNvPr id="291" name="Google Shape;291;g394de495115_0_0"/>
+          <p:cNvPr id="295" name="Google Shape;295;g39ec7bcbe7a_0_175"/>
           <p:cNvSpPr txBox="1"/>
           <p:nvPr/>
         </p:nvSpPr>
@@ -25778,7 +25779,7 @@
       </p:sp>
       <p:pic>
         <p:nvPicPr>
-          <p:cNvPr id="292" name="Google Shape;292;g394de495115_0_0" title="Screenshot 2025-10-30 at 9.23.27 PM.png"/>
+          <p:cNvPr id="296" name="Google Shape;296;g39ec7bcbe7a_0_175" title="Image_002.jpg"/>
           <p:cNvPicPr preferRelativeResize="0"/>
           <p:nvPr/>
         </p:nvPicPr>
@@ -25792,8 +25793,8 @@
         </p:blipFill>
         <p:spPr>
           <a:xfrm>
-            <a:off x="515998" y="1111025"/>
-            <a:ext cx="5450576" cy="4175700"/>
+            <a:off x="1802000" y="986125"/>
+            <a:ext cx="5997199" cy="4885750"/>
           </a:xfrm>
           <a:prstGeom prst="rect">
             <a:avLst/>
@@ -25804,193 +25805,6 @@
           </a:ln>
         </p:spPr>
       </p:pic>
-      <p:sp>
-        <p:nvSpPr>
-          <p:cNvPr id="293" name="Google Shape;293;g394de495115_0_0"/>
-          <p:cNvSpPr/>
-          <p:nvPr/>
-        </p:nvSpPr>
-        <p:spPr>
-          <a:xfrm>
-            <a:off x="4566325" y="2711950"/>
-            <a:ext cx="1564800" cy="943500"/>
-          </a:xfrm>
-          <a:prstGeom prst="ellipse">
-            <a:avLst/>
-          </a:prstGeom>
-          <a:noFill/>
-          <a:ln cap="flat" cmpd="sng" w="28575">
-            <a:solidFill>
-              <a:schemeClr val="dk2"/>
-            </a:solidFill>
-            <a:prstDash val="solid"/>
-            <a:round/>
-            <a:headEnd len="sm" w="sm" type="none"/>
-            <a:tailEnd len="sm" w="sm" type="none"/>
-          </a:ln>
-        </p:spPr>
-        <p:txBody>
-          <a:bodyPr anchorCtr="0" anchor="ctr" bIns="91425" lIns="91425" spcFirstLastPara="1" rIns="91425" wrap="square" tIns="91425">
-            <a:noAutofit/>
-          </a:bodyPr>
-          <a:lstStyle/>
-          <a:p>
-            <a:pPr indent="0" lvl="0" marL="0" rtl="0" algn="ctr">
-              <a:spcBef>
-                <a:spcPts val="0"/>
-              </a:spcBef>
-              <a:spcAft>
-                <a:spcPts val="0"/>
-              </a:spcAft>
-              <a:buNone/>
-            </a:pPr>
-            <a:r>
-              <a:t/>
-            </a:r>
-            <a:endParaRPr>
-              <a:latin typeface="Arial Black"/>
-              <a:ea typeface="Arial Black"/>
-              <a:cs typeface="Arial Black"/>
-              <a:sym typeface="Arial Black"/>
-            </a:endParaRPr>
-          </a:p>
-        </p:txBody>
-      </p:sp>
-      <p:sp>
-        <p:nvSpPr>
-          <p:cNvPr id="294" name="Google Shape;294;g394de495115_0_0"/>
-          <p:cNvSpPr txBox="1"/>
-          <p:nvPr/>
-        </p:nvSpPr>
-        <p:spPr>
-          <a:xfrm>
-            <a:off x="6004925" y="1016650"/>
-            <a:ext cx="1741500" cy="744000"/>
-          </a:xfrm>
-          <a:prstGeom prst="rect">
-            <a:avLst/>
-          </a:prstGeom>
-          <a:noFill/>
-          <a:ln cap="flat" cmpd="sng" w="28575">
-            <a:solidFill>
-              <a:schemeClr val="dk2"/>
-            </a:solidFill>
-            <a:prstDash val="solid"/>
-            <a:round/>
-            <a:headEnd len="sm" w="sm" type="none"/>
-            <a:tailEnd len="sm" w="sm" type="none"/>
-          </a:ln>
-        </p:spPr>
-        <p:txBody>
-          <a:bodyPr anchorCtr="0" anchor="t" bIns="91425" lIns="91425" spcFirstLastPara="1" rIns="91425" wrap="square" tIns="91425">
-            <a:noAutofit/>
-          </a:bodyPr>
-          <a:lstStyle/>
-          <a:p>
-            <a:pPr indent="0" lvl="0" marL="0" rtl="0" algn="l">
-              <a:spcBef>
-                <a:spcPts val="0"/>
-              </a:spcBef>
-              <a:spcAft>
-                <a:spcPts val="0"/>
-              </a:spcAft>
-              <a:buNone/>
-            </a:pPr>
-            <a:r>
-              <a:rPr lang="en-US" sz="2100">
-                <a:solidFill>
-                  <a:schemeClr val="dk2"/>
-                </a:solidFill>
-              </a:rPr>
-              <a:t>Most of y’alls work is here!</a:t>
-            </a:r>
-            <a:endParaRPr sz="2100">
-              <a:solidFill>
-                <a:schemeClr val="dk2"/>
-              </a:solidFill>
-            </a:endParaRPr>
-          </a:p>
-        </p:txBody>
-      </p:sp>
-      <p:cxnSp>
-        <p:nvCxnSpPr>
-          <p:cNvPr id="295" name="Google Shape;295;g394de495115_0_0"/>
-          <p:cNvCxnSpPr>
-            <a:stCxn id="294" idx="2"/>
-            <a:endCxn id="293" idx="0"/>
-          </p:cNvCxnSpPr>
-          <p:nvPr/>
-        </p:nvCxnSpPr>
-        <p:spPr>
-          <a:xfrm flipH="1">
-            <a:off x="5348675" y="1760650"/>
-            <a:ext cx="1527000" cy="951300"/>
-          </a:xfrm>
-          <a:prstGeom prst="straightConnector1">
-            <a:avLst/>
-          </a:prstGeom>
-          <a:noFill/>
-          <a:ln cap="flat" cmpd="sng" w="28575">
-            <a:solidFill>
-              <a:schemeClr val="dk2"/>
-            </a:solidFill>
-            <a:prstDash val="solid"/>
-            <a:round/>
-            <a:headEnd len="med" w="med" type="none"/>
-            <a:tailEnd len="med" w="med" type="triangle"/>
-          </a:ln>
-        </p:spPr>
-      </p:cxnSp>
-      <p:sp>
-        <p:nvSpPr>
-          <p:cNvPr id="296" name="Google Shape;296;g394de495115_0_0"/>
-          <p:cNvSpPr txBox="1"/>
-          <p:nvPr/>
-        </p:nvSpPr>
-        <p:spPr>
-          <a:xfrm>
-            <a:off x="111150" y="5174400"/>
-            <a:ext cx="8921700" cy="805500"/>
-          </a:xfrm>
-          <a:prstGeom prst="rect">
-            <a:avLst/>
-          </a:prstGeom>
-          <a:noFill/>
-          <a:ln>
-            <a:noFill/>
-          </a:ln>
-        </p:spPr>
-        <p:txBody>
-          <a:bodyPr anchorCtr="0" anchor="t" bIns="91425" lIns="91425" spcFirstLastPara="1" rIns="91425" wrap="square" tIns="91425">
-            <a:noAutofit/>
-          </a:bodyPr>
-          <a:lstStyle/>
-          <a:p>
-            <a:pPr indent="0" lvl="0" marL="0" rtl="0" algn="ctr">
-              <a:spcBef>
-                <a:spcPts val="0"/>
-              </a:spcBef>
-              <a:spcAft>
-                <a:spcPts val="0"/>
-              </a:spcAft>
-              <a:buNone/>
-            </a:pPr>
-            <a:r>
-              <a:rPr lang="en-US" sz="2300">
-                <a:solidFill>
-                  <a:schemeClr val="dk1"/>
-                </a:solidFill>
-              </a:rPr>
-              <a:t>Basic swapping algorithm for single process already provided in pager-basic.c!! </a:t>
-            </a:r>
-            <a:endParaRPr sz="2300">
-              <a:solidFill>
-                <a:schemeClr val="dk1"/>
-              </a:solidFill>
-            </a:endParaRPr>
-          </a:p>
-        </p:txBody>
-      </p:sp>
     </p:spTree>
   </p:cSld>
   <p:clrMapOvr>
@@ -26018,7 +25832,7 @@
       </p:grpSpPr>
       <p:sp>
         <p:nvSpPr>
-          <p:cNvPr id="301" name="Google Shape;301;g39ec7bcbe7a_0_175"/>
+          <p:cNvPr id="301" name="Google Shape;301;g39f09b76c23_0_6"/>
           <p:cNvSpPr txBox="1"/>
           <p:nvPr/>
         </p:nvSpPr>
@@ -26059,36 +25873,12 @@
               <a:buNone/>
             </a:pPr>
             <a:r>
-              <a:rPr b="0" i="0" lang="en-US" sz="4000" u="none" cap="none" strike="noStrike">
+              <a:rPr lang="en-US" sz="4000">
                 <a:solidFill>
                   <a:schemeClr val="dk1"/>
                 </a:solidFill>
-                <a:latin typeface="Arial"/>
-                <a:ea typeface="Arial"/>
-                <a:cs typeface="Arial"/>
-                <a:sym typeface="Arial"/>
               </a:rPr>
-              <a:t>PA</a:t>
-            </a:r>
-            <a:r>
-              <a:rPr lang="en-US" sz="4000">
-                <a:solidFill>
-                  <a:schemeClr val="dk1"/>
-                </a:solidFill>
-              </a:rPr>
-              <a:t>7</a:t>
-            </a:r>
-            <a:r>
-              <a:rPr b="0" i="0" lang="en-US" sz="4000" u="none" cap="none" strike="noStrike">
-                <a:solidFill>
-                  <a:schemeClr val="dk1"/>
-                </a:solidFill>
-                <a:latin typeface="Arial"/>
-                <a:ea typeface="Arial"/>
-                <a:cs typeface="Arial"/>
-                <a:sym typeface="Arial"/>
-              </a:rPr>
-              <a:t> Diagram</a:t>
+              <a:t>PA7</a:t>
             </a:r>
             <a:endParaRPr b="0" i="0" sz="4000" u="none" cap="none" strike="noStrike">
               <a:solidFill>
@@ -26104,7 +25894,7 @@
       </p:sp>
       <p:sp>
         <p:nvSpPr>
-          <p:cNvPr id="302" name="Google Shape;302;g39ec7bcbe7a_0_175"/>
+          <p:cNvPr id="302" name="Google Shape;302;g39f09b76c23_0_6"/>
           <p:cNvSpPr txBox="1"/>
           <p:nvPr/>
         </p:nvSpPr>
@@ -26168,9 +25958,285 @@
           </a:p>
         </p:txBody>
       </p:sp>
+      <p:sp>
+        <p:nvSpPr>
+          <p:cNvPr id="303" name="Google Shape;303;g39f09b76c23_0_6"/>
+          <p:cNvSpPr txBox="1"/>
+          <p:nvPr/>
+        </p:nvSpPr>
+        <p:spPr>
+          <a:xfrm>
+            <a:off x="480800" y="1129725"/>
+            <a:ext cx="8549700" cy="3506400"/>
+          </a:xfrm>
+          <a:prstGeom prst="rect">
+            <a:avLst/>
+          </a:prstGeom>
+          <a:noFill/>
+          <a:ln>
+            <a:noFill/>
+          </a:ln>
+        </p:spPr>
+        <p:txBody>
+          <a:bodyPr anchorCtr="0" anchor="t" bIns="91425" lIns="91425" spcFirstLastPara="1" rIns="91425" wrap="square" tIns="91425">
+            <a:noAutofit/>
+          </a:bodyPr>
+          <a:lstStyle/>
+          <a:p>
+            <a:pPr indent="-374650" lvl="0" marL="457200" marR="0" rtl="0" algn="l">
+              <a:lnSpc>
+                <a:spcPct val="100000"/>
+              </a:lnSpc>
+              <a:spcBef>
+                <a:spcPts val="0"/>
+              </a:spcBef>
+              <a:spcAft>
+                <a:spcPts val="0"/>
+              </a:spcAft>
+              <a:buClr>
+                <a:schemeClr val="dk1"/>
+              </a:buClr>
+              <a:buSzPts val="2300"/>
+              <a:buChar char="●"/>
+            </a:pPr>
+            <a:r>
+              <a:rPr lang="en-US" sz="2300">
+                <a:solidFill>
+                  <a:schemeClr val="dk1"/>
+                </a:solidFill>
+              </a:rPr>
+              <a:t>Goal: Implement a LRU paging strategy which a paging simulator can use to improve the performance of the memory accesses in a set of predefined programs</a:t>
+            </a:r>
+            <a:endParaRPr sz="2300">
+              <a:solidFill>
+                <a:schemeClr val="dk1"/>
+              </a:solidFill>
+            </a:endParaRPr>
+          </a:p>
+          <a:p>
+            <a:pPr indent="0" lvl="0" marL="457200" marR="0" rtl="0" algn="l">
+              <a:lnSpc>
+                <a:spcPct val="100000"/>
+              </a:lnSpc>
+              <a:spcBef>
+                <a:spcPts val="0"/>
+              </a:spcBef>
+              <a:spcAft>
+                <a:spcPts val="0"/>
+              </a:spcAft>
+              <a:buNone/>
+            </a:pPr>
+            <a:r>
+              <a:t/>
+            </a:r>
+            <a:endParaRPr sz="2300">
+              <a:solidFill>
+                <a:schemeClr val="dk1"/>
+              </a:solidFill>
+            </a:endParaRPr>
+          </a:p>
+          <a:p>
+            <a:pPr indent="-349250" lvl="1" marL="914400" marR="0" rtl="0" algn="l">
+              <a:lnSpc>
+                <a:spcPct val="100000"/>
+              </a:lnSpc>
+              <a:spcBef>
+                <a:spcPts val="0"/>
+              </a:spcBef>
+              <a:spcAft>
+                <a:spcPts val="0"/>
+              </a:spcAft>
+              <a:buClr>
+                <a:schemeClr val="dk1"/>
+              </a:buClr>
+              <a:buSzPts val="1900"/>
+              <a:buChar char="○"/>
+            </a:pPr>
+            <a:r>
+              <a:rPr lang="en-US" sz="1900">
+                <a:solidFill>
+                  <a:schemeClr val="dk1"/>
+                </a:solidFill>
+              </a:rPr>
+              <a:t>pager-basic.c offers a simple, already completed pageit() function which only allows for a single process and page to be in memory at a time</a:t>
+            </a:r>
+            <a:endParaRPr sz="1900">
+              <a:solidFill>
+                <a:schemeClr val="dk1"/>
+              </a:solidFill>
+            </a:endParaRPr>
+          </a:p>
+          <a:p>
+            <a:pPr indent="-349250" lvl="2" marL="1371600" marR="0" rtl="0" algn="l">
+              <a:lnSpc>
+                <a:spcPct val="100000"/>
+              </a:lnSpc>
+              <a:spcBef>
+                <a:spcPts val="0"/>
+              </a:spcBef>
+              <a:spcAft>
+                <a:spcPts val="0"/>
+              </a:spcAft>
+              <a:buClr>
+                <a:schemeClr val="dk1"/>
+              </a:buClr>
+              <a:buSzPts val="1900"/>
+              <a:buChar char="■"/>
+            </a:pPr>
+            <a:r>
+              <a:rPr lang="en-US" sz="1900">
+                <a:solidFill>
+                  <a:schemeClr val="dk1"/>
+                </a:solidFill>
+              </a:rPr>
+              <a:t>Great for seeing/understanding how to work with the data</a:t>
+            </a:r>
+            <a:endParaRPr sz="1900">
+              <a:solidFill>
+                <a:schemeClr val="dk1"/>
+              </a:solidFill>
+            </a:endParaRPr>
+          </a:p>
+          <a:p>
+            <a:pPr indent="0" lvl="0" marL="1371600" marR="0" rtl="0" algn="l">
+              <a:lnSpc>
+                <a:spcPct val="100000"/>
+              </a:lnSpc>
+              <a:spcBef>
+                <a:spcPts val="0"/>
+              </a:spcBef>
+              <a:spcAft>
+                <a:spcPts val="0"/>
+              </a:spcAft>
+              <a:buNone/>
+            </a:pPr>
+            <a:r>
+              <a:t/>
+            </a:r>
+            <a:endParaRPr sz="1900">
+              <a:solidFill>
+                <a:schemeClr val="dk1"/>
+              </a:solidFill>
+            </a:endParaRPr>
+          </a:p>
+          <a:p>
+            <a:pPr indent="-349250" lvl="1" marL="914400" marR="0" rtl="0" algn="l">
+              <a:lnSpc>
+                <a:spcPct val="100000"/>
+              </a:lnSpc>
+              <a:spcBef>
+                <a:spcPts val="0"/>
+              </a:spcBef>
+              <a:spcAft>
+                <a:spcPts val="0"/>
+              </a:spcAft>
+              <a:buClr>
+                <a:schemeClr val="dk1"/>
+              </a:buClr>
+              <a:buSzPts val="1900"/>
+              <a:buChar char="○"/>
+            </a:pPr>
+            <a:r>
+              <a:rPr lang="en-US" sz="1900">
+                <a:solidFill>
+                  <a:schemeClr val="dk1"/>
+                </a:solidFill>
+              </a:rPr>
+              <a:t>pager-lru.c is where you will do your work</a:t>
+            </a:r>
+            <a:endParaRPr sz="1900">
+              <a:solidFill>
+                <a:schemeClr val="dk1"/>
+              </a:solidFill>
+            </a:endParaRPr>
+          </a:p>
+        </p:txBody>
+      </p:sp>
+      <p:sp>
+        <p:nvSpPr>
+          <p:cNvPr id="304" name="Google Shape;304;g39f09b76c23_0_6"/>
+          <p:cNvSpPr txBox="1"/>
+          <p:nvPr/>
+        </p:nvSpPr>
+        <p:spPr>
+          <a:xfrm>
+            <a:off x="493325" y="4689725"/>
+            <a:ext cx="8549700" cy="1206000"/>
+          </a:xfrm>
+          <a:prstGeom prst="rect">
+            <a:avLst/>
+          </a:prstGeom>
+          <a:noFill/>
+          <a:ln>
+            <a:noFill/>
+          </a:ln>
+        </p:spPr>
+        <p:txBody>
+          <a:bodyPr anchorCtr="0" anchor="t" bIns="91425" lIns="91425" spcFirstLastPara="1" rIns="91425" wrap="square" tIns="91425">
+            <a:noAutofit/>
+          </a:bodyPr>
+          <a:lstStyle/>
+          <a:p>
+            <a:pPr indent="0" lvl="0" marL="0" rtl="0" algn="l">
+              <a:spcBef>
+                <a:spcPts val="0"/>
+              </a:spcBef>
+              <a:spcAft>
+                <a:spcPts val="0"/>
+              </a:spcAft>
+              <a:buNone/>
+            </a:pPr>
+            <a:r>
+              <a:rPr lang="en-US">
+                <a:solidFill>
+                  <a:schemeClr val="dk1"/>
+                </a:solidFill>
+              </a:rPr>
+              <a:t>To make and run:	</a:t>
+            </a:r>
+            <a:r>
+              <a:rPr b="1" lang="en-US">
+                <a:solidFill>
+                  <a:schemeClr val="dk1"/>
+                </a:solidFill>
+              </a:rPr>
+              <a:t>make all</a:t>
+            </a:r>
+            <a:endParaRPr b="1">
+              <a:solidFill>
+                <a:schemeClr val="dk1"/>
+              </a:solidFill>
+            </a:endParaRPr>
+          </a:p>
+          <a:p>
+            <a:pPr indent="0" lvl="0" marL="0" rtl="0" algn="l">
+              <a:spcBef>
+                <a:spcPts val="0"/>
+              </a:spcBef>
+              <a:spcAft>
+                <a:spcPts val="0"/>
+              </a:spcAft>
+              <a:buNone/>
+            </a:pPr>
+            <a:r>
+              <a:rPr b="1" lang="en-US">
+                <a:solidFill>
+                  <a:schemeClr val="dk1"/>
+                </a:solidFill>
+              </a:rPr>
+              <a:t>				./test-basic OR ./test-lru</a:t>
+            </a:r>
+            <a:endParaRPr b="1">
+              <a:solidFill>
+                <a:schemeClr val="dk1"/>
+              </a:solidFill>
+            </a:endParaRPr>
+          </a:p>
+        </p:txBody>
+      </p:sp>
       <p:pic>
         <p:nvPicPr>
-          <p:cNvPr id="303" name="Google Shape;303;g39ec7bcbe7a_0_175" title="Image_002.jpg"/>
+          <p:cNvPr id="305" name="Google Shape;305;g39f09b76c23_0_6" title="Screenshot 2025-10-31 at 9.23.07 AM.png"/>
           <p:cNvPicPr preferRelativeResize="0"/>
           <p:nvPr/>
         </p:nvPicPr>
@@ -26184,8 +26250,8 @@
         </p:blipFill>
         <p:spPr>
           <a:xfrm>
-            <a:off x="1802000" y="986125"/>
-            <a:ext cx="5997199" cy="4885750"/>
+            <a:off x="4644703" y="4689725"/>
+            <a:ext cx="4398322" cy="1206000"/>
           </a:xfrm>
           <a:prstGeom prst="rect">
             <a:avLst/>
@@ -26507,7 +26573,7 @@
                   <a:schemeClr val="dk1"/>
                 </a:solidFill>
               </a:rPr>
-              <a:t>PA7 is due NEXT sunday!</a:t>
+              <a:t>PA7 is due NEXT Sunday!</a:t>
             </a:r>
             <a:endParaRPr sz="2000" u="sng">
               <a:solidFill>
@@ -28072,7 +28138,7 @@
                   <a:schemeClr val="dk1"/>
                 </a:solidFill>
               </a:rPr>
-              <a:t>Virtual memory paes and physical memory page frames are of the same size</a:t>
+              <a:t>Virtual memory pages and physical memory page frames are of the same size</a:t>
             </a:r>
             <a:endParaRPr sz="2300">
               <a:solidFill>
@@ -29148,6 +29214,285 @@
 </file>
 
 <file path=ppt/theme/theme1.xml><?xml version="1.0" encoding="utf-8"?>
+<a:theme xmlns:a="http://schemas.openxmlformats.org/drawingml/2006/main" xmlns:r="http://schemas.openxmlformats.org/officeDocument/2006/relationships" name="Office Theme">
+  <a:themeElements>
+    <a:clrScheme name="Office">
+      <a:dk1>
+        <a:srgbClr val="000000"/>
+      </a:dk1>
+      <a:lt1>
+        <a:srgbClr val="FFFFFF"/>
+      </a:lt1>
+      <a:dk2>
+        <a:srgbClr val="1F497D"/>
+      </a:dk2>
+      <a:lt2>
+        <a:srgbClr val="EEECE1"/>
+      </a:lt2>
+      <a:accent1>
+        <a:srgbClr val="4F81BD"/>
+      </a:accent1>
+      <a:accent2>
+        <a:srgbClr val="C0504D"/>
+      </a:accent2>
+      <a:accent3>
+        <a:srgbClr val="9BBB59"/>
+      </a:accent3>
+      <a:accent4>
+        <a:srgbClr val="8064A2"/>
+      </a:accent4>
+      <a:accent5>
+        <a:srgbClr val="4BACC6"/>
+      </a:accent5>
+      <a:accent6>
+        <a:srgbClr val="F79646"/>
+      </a:accent6>
+      <a:hlink>
+        <a:srgbClr val="0000FF"/>
+      </a:hlink>
+      <a:folHlink>
+        <a:srgbClr val="800080"/>
+      </a:folHlink>
+    </a:clrScheme>
+    <a:fontScheme name="Office">
+      <a:majorFont>
+        <a:latin typeface="Arial"/>
+        <a:ea typeface=""/>
+        <a:cs typeface=""/>
+        <a:font script="Jpan" typeface="ＭＳ Ｐゴシック"/>
+        <a:font script="Hang" typeface="맑은 고딕"/>
+        <a:font script="Hans" typeface="宋体"/>
+        <a:font script="Hant" typeface="新細明體"/>
+        <a:font script="Arab" typeface="Times New Roman"/>
+        <a:font script="Hebr" typeface="Times New Roman"/>
+        <a:font script="Thai" typeface="Angsana New"/>
+        <a:font script="Ethi" typeface="Nyala"/>
+        <a:font script="Beng" typeface="Vrinda"/>
+        <a:font script="Gujr" typeface="Shruti"/>
+        <a:font script="Khmr" typeface="MoolBoran"/>
+        <a:font script="Knda" typeface="Tunga"/>
+        <a:font script="Guru" typeface="Raavi"/>
+        <a:font script="Cans" typeface="Euphemia"/>
+        <a:font script="Cher" typeface="Plantagenet Cherokee"/>
+        <a:font script="Yiii" typeface="Microsoft Yi Baiti"/>
+        <a:font script="Tibt" typeface="Microsoft Himalaya"/>
+        <a:font script="Thaa" typeface="MV Boli"/>
+        <a:font script="Deva" typeface="Mangal"/>
+        <a:font script="Telu" typeface="Gautami"/>
+        <a:font script="Taml" typeface="Latha"/>
+        <a:font script="Syrc" typeface="Estrangelo Edessa"/>
+        <a:font script="Orya" typeface="Kalinga"/>
+        <a:font script="Mlym" typeface="Kartika"/>
+        <a:font script="Laoo" typeface="DokChampa"/>
+        <a:font script="Sinh" typeface="Iskoola Pota"/>
+        <a:font script="Mong" typeface="Mongolian Baiti"/>
+        <a:font script="Viet" typeface="Times New Roman"/>
+        <a:font script="Uigh" typeface="Microsoft Uighur"/>
+        <a:font script="Geor" typeface="Sylfaen"/>
+      </a:majorFont>
+      <a:minorFont>
+        <a:latin typeface="Arial"/>
+        <a:ea typeface=""/>
+        <a:cs typeface=""/>
+        <a:font script="Jpan" typeface="ＭＳ Ｐゴシック"/>
+        <a:font script="Hang" typeface="맑은 고딕"/>
+        <a:font script="Hans" typeface="宋体"/>
+        <a:font script="Hant" typeface="新細明體"/>
+        <a:font script="Arab" typeface="Arial"/>
+        <a:font script="Hebr" typeface="Arial"/>
+        <a:font script="Thai" typeface="Cordia New"/>
+        <a:font script="Ethi" typeface="Nyala"/>
+        <a:font script="Beng" typeface="Vrinda"/>
+        <a:font script="Gujr" typeface="Shruti"/>
+        <a:font script="Khmr" typeface="DaunPenh"/>
+        <a:font script="Knda" typeface="Tunga"/>
+        <a:font script="Guru" typeface="Raavi"/>
+        <a:font script="Cans" typeface="Euphemia"/>
+        <a:font script="Cher" typeface="Plantagenet Cherokee"/>
+        <a:font script="Yiii" typeface="Microsoft Yi Baiti"/>
+        <a:font script="Tibt" typeface="Microsoft Himalaya"/>
+        <a:font script="Thaa" typeface="MV Boli"/>
+        <a:font script="Deva" typeface="Mangal"/>
+        <a:font script="Telu" typeface="Gautami"/>
+        <a:font script="Taml" typeface="Latha"/>
+        <a:font script="Syrc" typeface="Estrangelo Edessa"/>
+        <a:font script="Orya" typeface="Kalinga"/>
+        <a:font script="Mlym" typeface="Kartika"/>
+        <a:font script="Laoo" typeface="DokChampa"/>
+        <a:font script="Sinh" typeface="Iskoola Pota"/>
+        <a:font script="Mong" typeface="Mongolian Baiti"/>
+        <a:font script="Viet" typeface="Arial"/>
+        <a:font script="Uigh" typeface="Microsoft Uighur"/>
+        <a:font script="Geor" typeface="Sylfaen"/>
+      </a:minorFont>
+    </a:fontScheme>
+    <a:fmtScheme name="Office">
+      <a:fillStyleLst>
+        <a:solidFill>
+          <a:schemeClr val="phClr"/>
+        </a:solidFill>
+        <a:gradFill rotWithShape="1">
+          <a:gsLst>
+            <a:gs pos="0">
+              <a:schemeClr val="phClr">
+                <a:tint val="50000"/>
+                <a:satMod val="300000"/>
+              </a:schemeClr>
+            </a:gs>
+            <a:gs pos="35000">
+              <a:schemeClr val="phClr">
+                <a:tint val="37000"/>
+                <a:satMod val="300000"/>
+              </a:schemeClr>
+            </a:gs>
+            <a:gs pos="100000">
+              <a:schemeClr val="phClr">
+                <a:tint val="15000"/>
+                <a:satMod val="350000"/>
+              </a:schemeClr>
+            </a:gs>
+          </a:gsLst>
+          <a:lin ang="16200000" scaled="1"/>
+        </a:gradFill>
+        <a:gradFill rotWithShape="1">
+          <a:gsLst>
+            <a:gs pos="0">
+              <a:schemeClr val="phClr">
+                <a:tint val="100000"/>
+                <a:shade val="100000"/>
+                <a:satMod val="130000"/>
+              </a:schemeClr>
+            </a:gs>
+            <a:gs pos="100000">
+              <a:schemeClr val="phClr">
+                <a:tint val="50000"/>
+                <a:shade val="100000"/>
+                <a:satMod val="350000"/>
+              </a:schemeClr>
+            </a:gs>
+          </a:gsLst>
+          <a:lin ang="16200000" scaled="0"/>
+        </a:gradFill>
+      </a:fillStyleLst>
+      <a:lnStyleLst>
+        <a:ln w="9525" cap="flat" cmpd="sng" algn="ctr">
+          <a:solidFill>
+            <a:schemeClr val="phClr">
+              <a:shade val="95000"/>
+              <a:satMod val="105000"/>
+            </a:schemeClr>
+          </a:solidFill>
+          <a:prstDash val="solid"/>
+        </a:ln>
+        <a:ln w="25400" cap="flat" cmpd="sng" algn="ctr">
+          <a:solidFill>
+            <a:schemeClr val="phClr"/>
+          </a:solidFill>
+          <a:prstDash val="solid"/>
+        </a:ln>
+        <a:ln w="38100" cap="flat" cmpd="sng" algn="ctr">
+          <a:solidFill>
+            <a:schemeClr val="phClr"/>
+          </a:solidFill>
+          <a:prstDash val="solid"/>
+        </a:ln>
+      </a:lnStyleLst>
+      <a:effectStyleLst>
+        <a:effectStyle>
+          <a:effectLst>
+            <a:outerShdw blurRad="40000" dist="20000" dir="5400000" rotWithShape="0">
+              <a:srgbClr val="000000">
+                <a:alpha val="38000"/>
+              </a:srgbClr>
+            </a:outerShdw>
+          </a:effectLst>
+        </a:effectStyle>
+        <a:effectStyle>
+          <a:effectLst>
+            <a:outerShdw blurRad="40000" dist="23000" dir="5400000" rotWithShape="0">
+              <a:srgbClr val="000000">
+                <a:alpha val="35000"/>
+              </a:srgbClr>
+            </a:outerShdw>
+          </a:effectLst>
+        </a:effectStyle>
+        <a:effectStyle>
+          <a:effectLst>
+            <a:outerShdw blurRad="40000" dist="23000" dir="5400000" rotWithShape="0">
+              <a:srgbClr val="000000">
+                <a:alpha val="35000"/>
+              </a:srgbClr>
+            </a:outerShdw>
+          </a:effectLst>
+          <a:scene3d>
+            <a:camera prst="orthographicFront">
+              <a:rot lat="0" lon="0" rev="0"/>
+            </a:camera>
+            <a:lightRig rig="threePt" dir="t">
+              <a:rot lat="0" lon="0" rev="1200000"/>
+            </a:lightRig>
+          </a:scene3d>
+          <a:sp3d>
+            <a:bevelT w="63500" h="25400"/>
+          </a:sp3d>
+        </a:effectStyle>
+      </a:effectStyleLst>
+      <a:bgFillStyleLst>
+        <a:solidFill>
+          <a:schemeClr val="phClr"/>
+        </a:solidFill>
+        <a:gradFill rotWithShape="1">
+          <a:gsLst>
+            <a:gs pos="0">
+              <a:schemeClr val="phClr">
+                <a:tint val="40000"/>
+                <a:satMod val="350000"/>
+              </a:schemeClr>
+            </a:gs>
+            <a:gs pos="40000">
+              <a:schemeClr val="phClr">
+                <a:tint val="45000"/>
+                <a:shade val="99000"/>
+                <a:satMod val="350000"/>
+              </a:schemeClr>
+            </a:gs>
+            <a:gs pos="100000">
+              <a:schemeClr val="phClr">
+                <a:shade val="20000"/>
+                <a:satMod val="255000"/>
+              </a:schemeClr>
+            </a:gs>
+          </a:gsLst>
+          <a:path path="circle">
+            <a:fillToRect l="50000" t="-80000" r="50000" b="180000"/>
+          </a:path>
+        </a:gradFill>
+        <a:gradFill rotWithShape="1">
+          <a:gsLst>
+            <a:gs pos="0">
+              <a:schemeClr val="phClr">
+                <a:tint val="80000"/>
+                <a:satMod val="300000"/>
+              </a:schemeClr>
+            </a:gs>
+            <a:gs pos="100000">
+              <a:schemeClr val="phClr">
+                <a:shade val="30000"/>
+                <a:satMod val="200000"/>
+              </a:schemeClr>
+            </a:gs>
+          </a:gsLst>
+          <a:path path="circle">
+            <a:fillToRect l="50000" t="50000" r="50000" b="50000"/>
+          </a:path>
+        </a:gradFill>
+      </a:bgFillStyleLst>
+    </a:fmtScheme>
+  </a:themeElements>
+</a:theme>
+</file>
+
+<file path=ppt/theme/theme2.xml><?xml version="1.0" encoding="utf-8"?>
 <a:theme xmlns:a="http://schemas.openxmlformats.org/drawingml/2006/main" xmlns:r="http://schemas.openxmlformats.org/officeDocument/2006/relationships">
   <a:themeElements>
     <a:clrScheme name="Default">
@@ -29424,283 +29769,4 @@
     </a:fmtScheme>
   </a:themeElements>
 </a:theme>
-</file>
-
-<file path=ppt/theme/theme2.xml><?xml version="1.0" encoding="utf-8"?>
-<a:theme xmlns:a="http://schemas.openxmlformats.org/drawingml/2006/main" xmlns:r="http://schemas.openxmlformats.org/officeDocument/2006/relationships" name="Office Theme">
-  <a:themeElements>
-    <a:clrScheme name="Office">
-      <a:dk1>
-        <a:srgbClr val="000000"/>
-      </a:dk1>
-      <a:lt1>
-        <a:srgbClr val="FFFFFF"/>
-      </a:lt1>
-      <a:dk2>
-        <a:srgbClr val="1F497D"/>
-      </a:dk2>
-      <a:lt2>
-        <a:srgbClr val="EEECE1"/>
-      </a:lt2>
-      <a:accent1>
-        <a:srgbClr val="4F81BD"/>
-      </a:accent1>
-      <a:accent2>
-        <a:srgbClr val="C0504D"/>
-      </a:accent2>
-      <a:accent3>
-        <a:srgbClr val="9BBB59"/>
-      </a:accent3>
-      <a:accent4>
-        <a:srgbClr val="8064A2"/>
-      </a:accent4>
-      <a:accent5>
-        <a:srgbClr val="4BACC6"/>
-      </a:accent5>
-      <a:accent6>
-        <a:srgbClr val="F79646"/>
-      </a:accent6>
-      <a:hlink>
-        <a:srgbClr val="0000FF"/>
-      </a:hlink>
-      <a:folHlink>
-        <a:srgbClr val="800080"/>
-      </a:folHlink>
-    </a:clrScheme>
-    <a:fontScheme name="Office">
-      <a:majorFont>
-        <a:latin typeface="Arial"/>
-        <a:ea typeface=""/>
-        <a:cs typeface=""/>
-        <a:font script="Jpan" typeface="ＭＳ Ｐゴシック"/>
-        <a:font script="Hang" typeface="맑은 고딕"/>
-        <a:font script="Hans" typeface="宋体"/>
-        <a:font script="Hant" typeface="新細明體"/>
-        <a:font script="Arab" typeface="Times New Roman"/>
-        <a:font script="Hebr" typeface="Times New Roman"/>
-        <a:font script="Thai" typeface="Angsana New"/>
-        <a:font script="Ethi" typeface="Nyala"/>
-        <a:font script="Beng" typeface="Vrinda"/>
-        <a:font script="Gujr" typeface="Shruti"/>
-        <a:font script="Khmr" typeface="MoolBoran"/>
-        <a:font script="Knda" typeface="Tunga"/>
-        <a:font script="Guru" typeface="Raavi"/>
-        <a:font script="Cans" typeface="Euphemia"/>
-        <a:font script="Cher" typeface="Plantagenet Cherokee"/>
-        <a:font script="Yiii" typeface="Microsoft Yi Baiti"/>
-        <a:font script="Tibt" typeface="Microsoft Himalaya"/>
-        <a:font script="Thaa" typeface="MV Boli"/>
-        <a:font script="Deva" typeface="Mangal"/>
-        <a:font script="Telu" typeface="Gautami"/>
-        <a:font script="Taml" typeface="Latha"/>
-        <a:font script="Syrc" typeface="Estrangelo Edessa"/>
-        <a:font script="Orya" typeface="Kalinga"/>
-        <a:font script="Mlym" typeface="Kartika"/>
-        <a:font script="Laoo" typeface="DokChampa"/>
-        <a:font script="Sinh" typeface="Iskoola Pota"/>
-        <a:font script="Mong" typeface="Mongolian Baiti"/>
-        <a:font script="Viet" typeface="Times New Roman"/>
-        <a:font script="Uigh" typeface="Microsoft Uighur"/>
-        <a:font script="Geor" typeface="Sylfaen"/>
-      </a:majorFont>
-      <a:minorFont>
-        <a:latin typeface="Arial"/>
-        <a:ea typeface=""/>
-        <a:cs typeface=""/>
-        <a:font script="Jpan" typeface="ＭＳ Ｐゴシック"/>
-        <a:font script="Hang" typeface="맑은 고딕"/>
-        <a:font script="Hans" typeface="宋体"/>
-        <a:font script="Hant" typeface="新細明體"/>
-        <a:font script="Arab" typeface="Arial"/>
-        <a:font script="Hebr" typeface="Arial"/>
-        <a:font script="Thai" typeface="Cordia New"/>
-        <a:font script="Ethi" typeface="Nyala"/>
-        <a:font script="Beng" typeface="Vrinda"/>
-        <a:font script="Gujr" typeface="Shruti"/>
-        <a:font script="Khmr" typeface="DaunPenh"/>
-        <a:font script="Knda" typeface="Tunga"/>
-        <a:font script="Guru" typeface="Raavi"/>
-        <a:font script="Cans" typeface="Euphemia"/>
-        <a:font script="Cher" typeface="Plantagenet Cherokee"/>
-        <a:font script="Yiii" typeface="Microsoft Yi Baiti"/>
-        <a:font script="Tibt" typeface="Microsoft Himalaya"/>
-        <a:font script="Thaa" typeface="MV Boli"/>
-        <a:font script="Deva" typeface="Mangal"/>
-        <a:font script="Telu" typeface="Gautami"/>
-        <a:font script="Taml" typeface="Latha"/>
-        <a:font script="Syrc" typeface="Estrangelo Edessa"/>
-        <a:font script="Orya" typeface="Kalinga"/>
-        <a:font script="Mlym" typeface="Kartika"/>
-        <a:font script="Laoo" typeface="DokChampa"/>
-        <a:font script="Sinh" typeface="Iskoola Pota"/>
-        <a:font script="Mong" typeface="Mongolian Baiti"/>
-        <a:font script="Viet" typeface="Arial"/>
-        <a:font script="Uigh" typeface="Microsoft Uighur"/>
-        <a:font script="Geor" typeface="Sylfaen"/>
-      </a:minorFont>
-    </a:fontScheme>
-    <a:fmtScheme name="Office">
-      <a:fillStyleLst>
-        <a:solidFill>
-          <a:schemeClr val="phClr"/>
-        </a:solidFill>
-        <a:gradFill rotWithShape="1">
-          <a:gsLst>
-            <a:gs pos="0">
-              <a:schemeClr val="phClr">
-                <a:tint val="50000"/>
-                <a:satMod val="300000"/>
-              </a:schemeClr>
-            </a:gs>
-            <a:gs pos="35000">
-              <a:schemeClr val="phClr">
-                <a:tint val="37000"/>
-                <a:satMod val="300000"/>
-              </a:schemeClr>
-            </a:gs>
-            <a:gs pos="100000">
-              <a:schemeClr val="phClr">
-                <a:tint val="15000"/>
-                <a:satMod val="350000"/>
-              </a:schemeClr>
-            </a:gs>
-          </a:gsLst>
-          <a:lin ang="16200000" scaled="1"/>
-        </a:gradFill>
-        <a:gradFill rotWithShape="1">
-          <a:gsLst>
-            <a:gs pos="0">
-              <a:schemeClr val="phClr">
-                <a:tint val="100000"/>
-                <a:shade val="100000"/>
-                <a:satMod val="130000"/>
-              </a:schemeClr>
-            </a:gs>
-            <a:gs pos="100000">
-              <a:schemeClr val="phClr">
-                <a:tint val="50000"/>
-                <a:shade val="100000"/>
-                <a:satMod val="350000"/>
-              </a:schemeClr>
-            </a:gs>
-          </a:gsLst>
-          <a:lin ang="16200000" scaled="0"/>
-        </a:gradFill>
-      </a:fillStyleLst>
-      <a:lnStyleLst>
-        <a:ln w="9525" cap="flat" cmpd="sng" algn="ctr">
-          <a:solidFill>
-            <a:schemeClr val="phClr">
-              <a:shade val="95000"/>
-              <a:satMod val="105000"/>
-            </a:schemeClr>
-          </a:solidFill>
-          <a:prstDash val="solid"/>
-        </a:ln>
-        <a:ln w="25400" cap="flat" cmpd="sng" algn="ctr">
-          <a:solidFill>
-            <a:schemeClr val="phClr"/>
-          </a:solidFill>
-          <a:prstDash val="solid"/>
-        </a:ln>
-        <a:ln w="38100" cap="flat" cmpd="sng" algn="ctr">
-          <a:solidFill>
-            <a:schemeClr val="phClr"/>
-          </a:solidFill>
-          <a:prstDash val="solid"/>
-        </a:ln>
-      </a:lnStyleLst>
-      <a:effectStyleLst>
-        <a:effectStyle>
-          <a:effectLst>
-            <a:outerShdw blurRad="40000" dist="20000" dir="5400000" rotWithShape="0">
-              <a:srgbClr val="000000">
-                <a:alpha val="38000"/>
-              </a:srgbClr>
-            </a:outerShdw>
-          </a:effectLst>
-        </a:effectStyle>
-        <a:effectStyle>
-          <a:effectLst>
-            <a:outerShdw blurRad="40000" dist="23000" dir="5400000" rotWithShape="0">
-              <a:srgbClr val="000000">
-                <a:alpha val="35000"/>
-              </a:srgbClr>
-            </a:outerShdw>
-          </a:effectLst>
-        </a:effectStyle>
-        <a:effectStyle>
-          <a:effectLst>
-            <a:outerShdw blurRad="40000" dist="23000" dir="5400000" rotWithShape="0">
-              <a:srgbClr val="000000">
-                <a:alpha val="35000"/>
-              </a:srgbClr>
-            </a:outerShdw>
-          </a:effectLst>
-          <a:scene3d>
-            <a:camera prst="orthographicFront">
-              <a:rot lat="0" lon="0" rev="0"/>
-            </a:camera>
-            <a:lightRig rig="threePt" dir="t">
-              <a:rot lat="0" lon="0" rev="1200000"/>
-            </a:lightRig>
-          </a:scene3d>
-          <a:sp3d>
-            <a:bevelT w="63500" h="25400"/>
-          </a:sp3d>
-        </a:effectStyle>
-      </a:effectStyleLst>
-      <a:bgFillStyleLst>
-        <a:solidFill>
-          <a:schemeClr val="phClr"/>
-        </a:solidFill>
-        <a:gradFill rotWithShape="1">
-          <a:gsLst>
-            <a:gs pos="0">
-              <a:schemeClr val="phClr">
-                <a:tint val="40000"/>
-                <a:satMod val="350000"/>
-              </a:schemeClr>
-            </a:gs>
-            <a:gs pos="40000">
-              <a:schemeClr val="phClr">
-                <a:tint val="45000"/>
-                <a:shade val="99000"/>
-                <a:satMod val="350000"/>
-              </a:schemeClr>
-            </a:gs>
-            <a:gs pos="100000">
-              <a:schemeClr val="phClr">
-                <a:shade val="20000"/>
-                <a:satMod val="255000"/>
-              </a:schemeClr>
-            </a:gs>
-          </a:gsLst>
-          <a:path path="circle">
-            <a:fillToRect l="50000" t="-80000" r="50000" b="180000"/>
-          </a:path>
-        </a:gradFill>
-        <a:gradFill rotWithShape="1">
-          <a:gsLst>
-            <a:gs pos="0">
-              <a:schemeClr val="phClr">
-                <a:tint val="80000"/>
-                <a:satMod val="300000"/>
-              </a:schemeClr>
-            </a:gs>
-            <a:gs pos="100000">
-              <a:schemeClr val="phClr">
-                <a:shade val="30000"/>
-                <a:satMod val="200000"/>
-              </a:schemeClr>
-            </a:gs>
-          </a:gsLst>
-          <a:path path="circle">
-            <a:fillToRect l="50000" t="50000" r="50000" b="50000"/>
-          </a:path>
-        </a:gradFill>
-      </a:bgFillStyleLst>
-    </a:fmtScheme>
-  </a:themeElements>
-</a:theme>
 </file>
</xml_diff>